<commit_message>
Add advanced MV files and updated matrix solver presentation
</commit_message>
<xml_diff>
--- a/lectures/Day2_4lecture_MatrixSolvers.pptx
+++ b/lectures/Day2_4lecture_MatrixSolvers.pptx
@@ -12,18 +12,18 @@
   </p:handoutMasterIdLst>
   <p:sldIdLst>
     <p:sldId id="615" r:id="rId2"/>
-    <p:sldId id="587" r:id="rId3"/>
-    <p:sldId id="588" r:id="rId4"/>
+    <p:sldId id="588" r:id="rId3"/>
+    <p:sldId id="616" r:id="rId4"/>
     <p:sldId id="568" r:id="rId5"/>
     <p:sldId id="589" r:id="rId6"/>
-    <p:sldId id="590" r:id="rId7"/>
-    <p:sldId id="591" r:id="rId8"/>
-    <p:sldId id="592" r:id="rId9"/>
-    <p:sldId id="593" r:id="rId10"/>
-    <p:sldId id="594" r:id="rId11"/>
-    <p:sldId id="595" r:id="rId12"/>
-    <p:sldId id="596" r:id="rId13"/>
-    <p:sldId id="597" r:id="rId14"/>
+    <p:sldId id="617" r:id="rId7"/>
+    <p:sldId id="590" r:id="rId8"/>
+    <p:sldId id="591" r:id="rId9"/>
+    <p:sldId id="592" r:id="rId10"/>
+    <p:sldId id="593" r:id="rId11"/>
+    <p:sldId id="594" r:id="rId12"/>
+    <p:sldId id="595" r:id="rId13"/>
+    <p:sldId id="596" r:id="rId14"/>
     <p:sldId id="599" r:id="rId15"/>
     <p:sldId id="600" r:id="rId16"/>
     <p:sldId id="602" r:id="rId17"/>
@@ -1441,6 +1441,70 @@
 </p:notesMaster>
 </file>
 
+<file path=ppt/notesSlides/notesSlide1.xml><?xml version="1.0" encoding="utf-8"?>
+<p:notes xmlns:a="http://schemas.openxmlformats.org/drawingml/2006/main" xmlns:r="http://schemas.openxmlformats.org/officeDocument/2006/relationships" xmlns:p="http://schemas.openxmlformats.org/presentationml/2006/main">
+  <p:cSld>
+    <p:spTree>
+      <p:nvGrpSpPr>
+        <p:cNvPr id="1" name=""/>
+        <p:cNvGrpSpPr/>
+        <p:nvPr/>
+      </p:nvGrpSpPr>
+      <p:grpSpPr>
+        <a:xfrm>
+          <a:off x="0" y="0"/>
+          <a:ext cx="0" cy="0"/>
+          <a:chOff x="0" y="0"/>
+          <a:chExt cx="0" cy="0"/>
+        </a:xfrm>
+      </p:grpSpPr>
+      <p:sp>
+        <p:nvSpPr>
+          <p:cNvPr id="2" name="Slide Image Placeholder 1"/>
+          <p:cNvSpPr>
+            <a:spLocks noGrp="1" noRot="1" noChangeAspect="1"/>
+          </p:cNvSpPr>
+          <p:nvPr>
+            <p:ph type="sldImg"/>
+          </p:nvPr>
+        </p:nvSpPr>
+        <p:spPr/>
+      </p:sp>
+      <p:sp>
+        <p:nvSpPr>
+          <p:cNvPr id="3" name="Notes Placeholder 2"/>
+          <p:cNvSpPr>
+            <a:spLocks noGrp="1"/>
+          </p:cNvSpPr>
+          <p:nvPr>
+            <p:ph type="body" idx="1"/>
+          </p:nvPr>
+        </p:nvSpPr>
+        <p:spPr/>
+        <p:txBody>
+          <a:bodyPr/>
+          <a:lstStyle/>
+          <a:p>
+            <a:r>
+              <a:rPr lang="en-US" dirty="0"/>
+              <a:t>no-flow left boundary and a lake on the right side</a:t>
+            </a:r>
+          </a:p>
+        </p:txBody>
+      </p:sp>
+    </p:spTree>
+    <p:extLst>
+      <p:ext uri="{BB962C8B-B14F-4D97-AF65-F5344CB8AC3E}">
+        <p14:creationId xmlns:p14="http://schemas.microsoft.com/office/powerpoint/2010/main" val="2050810228"/>
+      </p:ext>
+    </p:extLst>
+  </p:cSld>
+  <p:clrMapOvr>
+    <a:masterClrMapping/>
+  </p:clrMapOvr>
+</p:notes>
+</file>
+
 <file path=ppt/slideLayouts/slideLayout1.xml><?xml version="1.0" encoding="utf-8"?>
 <p:sldLayout xmlns:a="http://schemas.openxmlformats.org/drawingml/2006/main" xmlns:r="http://schemas.openxmlformats.org/officeDocument/2006/relationships" xmlns:p="http://schemas.openxmlformats.org/presentationml/2006/main" showMasterSp="0" type="title" preserve="1">
   <p:cSld name="Title Slide">
@@ -4029,6 +4093,291 @@
       </p:sp>
       <p:sp>
         <p:nvSpPr>
+          <p:cNvPr id="3" name="Text Box 4">
+            <a:extLst>
+              <a:ext uri="{FF2B5EF4-FFF2-40B4-BE49-F238E27FC236}">
+                <a16:creationId xmlns:a16="http://schemas.microsoft.com/office/drawing/2014/main" id="{46217574-8E5C-C54C-9B59-718761D2C7EE}"/>
+              </a:ext>
+            </a:extLst>
+          </p:cNvPr>
+          <p:cNvSpPr txBox="1">
+            <a:spLocks noChangeArrowheads="1"/>
+          </p:cNvSpPr>
+          <p:nvPr/>
+        </p:nvSpPr>
+        <p:spPr bwMode="auto">
+          <a:xfrm>
+            <a:off x="2566988" y="4184650"/>
+            <a:ext cx="7021512" cy="1631950"/>
+          </a:xfrm>
+          <a:prstGeom prst="rect">
+            <a:avLst/>
+          </a:prstGeom>
+          <a:noFill/>
+          <a:ln>
+            <a:noFill/>
+          </a:ln>
+          <a:effectLst/>
+          <a:extLst>
+            <a:ext uri="{909E8E84-426E-40dd-AFC4-6F175D3DCCD1}">
+              <a14:hiddenFill xmlns="" xmlns:a14="http://schemas.microsoft.com/office/drawing/2010/main">
+                <a:solidFill>
+                  <a:schemeClr val="accent1"/>
+                </a:solidFill>
+              </a14:hiddenFill>
+            </a:ext>
+            <a:ext uri="{91240B29-F687-4f45-9708-019B960494DF}">
+              <a14:hiddenLine xmlns="" xmlns:a14="http://schemas.microsoft.com/office/drawing/2010/main" w="9525">
+                <a:solidFill>
+                  <a:schemeClr val="tx1"/>
+                </a:solidFill>
+                <a:miter lim="800000"/>
+                <a:headEnd/>
+                <a:tailEnd/>
+              </a14:hiddenLine>
+            </a:ext>
+            <a:ext uri="{AF507438-7753-43e0-B8FC-AC1667EBCBE1}">
+              <a14:hiddenEffects xmlns="" xmlns:a14="http://schemas.microsoft.com/office/drawing/2010/main">
+                <a:effectLst>
+                  <a:outerShdw blurRad="63500" dist="38099" dir="2700000" algn="ctr" rotWithShape="0">
+                    <a:schemeClr val="bg2">
+                      <a:alpha val="74998"/>
+                    </a:schemeClr>
+                  </a:outerShdw>
+                </a:effectLst>
+              </a14:hiddenEffects>
+            </a:ext>
+          </a:extLst>
+        </p:spPr>
+        <p:txBody>
+          <a:bodyPr>
+            <a:spAutoFit/>
+          </a:bodyPr>
+          <a:lstStyle>
+            <a:lvl1pPr eaLnBrk="0" hangingPunct="0">
+              <a:defRPr>
+                <a:solidFill>
+                  <a:schemeClr val="tx1"/>
+                </a:solidFill>
+                <a:latin typeface="Arial" charset="0"/>
+                <a:ea typeface="ＭＳ Ｐゴシック" charset="0"/>
+              </a:defRPr>
+            </a:lvl1pPr>
+            <a:lvl2pPr marL="742950" indent="-285750" eaLnBrk="0" hangingPunct="0">
+              <a:defRPr>
+                <a:solidFill>
+                  <a:schemeClr val="tx1"/>
+                </a:solidFill>
+                <a:latin typeface="Arial" charset="0"/>
+                <a:ea typeface="ＭＳ Ｐゴシック" charset="0"/>
+              </a:defRPr>
+            </a:lvl2pPr>
+            <a:lvl3pPr marL="1143000" indent="-228600" eaLnBrk="0" hangingPunct="0">
+              <a:defRPr>
+                <a:solidFill>
+                  <a:schemeClr val="tx1"/>
+                </a:solidFill>
+                <a:latin typeface="Arial" charset="0"/>
+                <a:ea typeface="ＭＳ Ｐゴシック" charset="0"/>
+              </a:defRPr>
+            </a:lvl3pPr>
+            <a:lvl4pPr marL="1600200" indent="-228600" eaLnBrk="0" hangingPunct="0">
+              <a:defRPr>
+                <a:solidFill>
+                  <a:schemeClr val="tx1"/>
+                </a:solidFill>
+                <a:latin typeface="Arial" charset="0"/>
+                <a:ea typeface="ＭＳ Ｐゴシック" charset="0"/>
+              </a:defRPr>
+            </a:lvl4pPr>
+            <a:lvl5pPr marL="2057400" indent="-228600" eaLnBrk="0" hangingPunct="0">
+              <a:defRPr>
+                <a:solidFill>
+                  <a:schemeClr val="tx1"/>
+                </a:solidFill>
+                <a:latin typeface="Arial" charset="0"/>
+                <a:ea typeface="ＭＳ Ｐゴシック" charset="0"/>
+              </a:defRPr>
+            </a:lvl5pPr>
+            <a:lvl6pPr marL="2514600" indent="-228600" eaLnBrk="0" fontAlgn="base" hangingPunct="0">
+              <a:spcBef>
+                <a:spcPct val="0"/>
+              </a:spcBef>
+              <a:spcAft>
+                <a:spcPct val="0"/>
+              </a:spcAft>
+              <a:defRPr>
+                <a:solidFill>
+                  <a:schemeClr val="tx1"/>
+                </a:solidFill>
+                <a:latin typeface="Arial" charset="0"/>
+                <a:ea typeface="ＭＳ Ｐゴシック" charset="0"/>
+              </a:defRPr>
+            </a:lvl6pPr>
+            <a:lvl7pPr marL="2971800" indent="-228600" eaLnBrk="0" fontAlgn="base" hangingPunct="0">
+              <a:spcBef>
+                <a:spcPct val="0"/>
+              </a:spcBef>
+              <a:spcAft>
+                <a:spcPct val="0"/>
+              </a:spcAft>
+              <a:defRPr>
+                <a:solidFill>
+                  <a:schemeClr val="tx1"/>
+                </a:solidFill>
+                <a:latin typeface="Arial" charset="0"/>
+                <a:ea typeface="ＭＳ Ｐゴシック" charset="0"/>
+              </a:defRPr>
+            </a:lvl7pPr>
+            <a:lvl8pPr marL="3429000" indent="-228600" eaLnBrk="0" fontAlgn="base" hangingPunct="0">
+              <a:spcBef>
+                <a:spcPct val="0"/>
+              </a:spcBef>
+              <a:spcAft>
+                <a:spcPct val="0"/>
+              </a:spcAft>
+              <a:defRPr>
+                <a:solidFill>
+                  <a:schemeClr val="tx1"/>
+                </a:solidFill>
+                <a:latin typeface="Arial" charset="0"/>
+                <a:ea typeface="ＭＳ Ｐゴシック" charset="0"/>
+              </a:defRPr>
+            </a:lvl8pPr>
+            <a:lvl9pPr marL="3886200" indent="-228600" eaLnBrk="0" fontAlgn="base" hangingPunct="0">
+              <a:spcBef>
+                <a:spcPct val="0"/>
+              </a:spcBef>
+              <a:spcAft>
+                <a:spcPct val="0"/>
+              </a:spcAft>
+              <a:defRPr>
+                <a:solidFill>
+                  <a:schemeClr val="tx1"/>
+                </a:solidFill>
+                <a:latin typeface="Arial" charset="0"/>
+                <a:ea typeface="ＭＳ Ｐゴシック" charset="0"/>
+              </a:defRPr>
+            </a:lvl9pPr>
+          </a:lstStyle>
+          <a:p>
+            <a:pPr marL="1143000" indent="-1143000" eaLnBrk="1" hangingPunct="1">
+              <a:spcBef>
+                <a:spcPct val="50000"/>
+              </a:spcBef>
+              <a:tabLst>
+                <a:tab pos="1143000" algn="l"/>
+              </a:tabLst>
+              <a:defRPr/>
+            </a:pPr>
+            <a:r>
+              <a:rPr lang="en-US" sz="2000" dirty="0">
+                <a:solidFill>
+                  <a:schemeClr val="bg1"/>
+                </a:solidFill>
+                <a:cs typeface="+mn-cs"/>
+              </a:rPr>
+              <a:t>Step 5 – 	Subtract a multiple of equation 2 from all lower equations to eliminate Y from those equations. That is, make the coefficient 0 for all rows in the column below A(2,2). Subtract 1 times equation 2 from equation 3.</a:t>
+            </a:r>
+          </a:p>
+        </p:txBody>
+      </p:sp>
+      <p:pic>
+        <p:nvPicPr>
+          <p:cNvPr id="4" name="Picture 3" descr="latex-image-1.pdf">
+            <a:extLst>
+              <a:ext uri="{FF2B5EF4-FFF2-40B4-BE49-F238E27FC236}">
+                <a16:creationId xmlns:a16="http://schemas.microsoft.com/office/drawing/2014/main" id="{BE92C163-E02F-574B-B0C8-FD01B8B824B6}"/>
+              </a:ext>
+            </a:extLst>
+          </p:cNvPr>
+          <p:cNvPicPr>
+            <a:picLocks noChangeAspect="1"/>
+          </p:cNvPicPr>
+          <p:nvPr/>
+        </p:nvPicPr>
+        <p:blipFill>
+          <a:blip r:embed="rId2">
+            <a:extLst>
+              <a:ext uri="{28A0092B-C50C-407E-A947-70E740481C1C}">
+                <a14:useLocalDpi xmlns:a14="http://schemas.microsoft.com/office/drawing/2010/main" val="0"/>
+              </a:ext>
+            </a:extLst>
+          </a:blip>
+          <a:stretch>
+            <a:fillRect/>
+          </a:stretch>
+        </p:blipFill>
+        <p:spPr>
+          <a:xfrm>
+            <a:off x="2895600" y="1133856"/>
+            <a:ext cx="6400800" cy="1968500"/>
+          </a:xfrm>
+          <a:prstGeom prst="rect">
+            <a:avLst/>
+          </a:prstGeom>
+        </p:spPr>
+      </p:pic>
+    </p:spTree>
+    <p:extLst>
+      <p:ext uri="{BB962C8B-B14F-4D97-AF65-F5344CB8AC3E}">
+        <p14:creationId xmlns:p14="http://schemas.microsoft.com/office/powerpoint/2010/main" val="2241180209"/>
+      </p:ext>
+    </p:extLst>
+  </p:cSld>
+  <p:clrMapOvr>
+    <a:masterClrMapping/>
+  </p:clrMapOvr>
+</p:sld>
+</file>
+
+<file path=ppt/slides/slide11.xml><?xml version="1.0" encoding="utf-8"?>
+<p:sld xmlns:a="http://schemas.openxmlformats.org/drawingml/2006/main" xmlns:r="http://schemas.openxmlformats.org/officeDocument/2006/relationships" xmlns:p="http://schemas.openxmlformats.org/presentationml/2006/main">
+  <p:cSld>
+    <p:spTree>
+      <p:nvGrpSpPr>
+        <p:cNvPr id="1" name=""/>
+        <p:cNvGrpSpPr/>
+        <p:nvPr/>
+      </p:nvGrpSpPr>
+      <p:grpSpPr>
+        <a:xfrm>
+          <a:off x="0" y="0"/>
+          <a:ext cx="0" cy="0"/>
+          <a:chOff x="0" y="0"/>
+          <a:chExt cx="0" cy="0"/>
+        </a:xfrm>
+      </p:grpSpPr>
+      <p:sp>
+        <p:nvSpPr>
+          <p:cNvPr id="2" name="Title 1">
+            <a:extLst>
+              <a:ext uri="{FF2B5EF4-FFF2-40B4-BE49-F238E27FC236}">
+                <a16:creationId xmlns:a16="http://schemas.microsoft.com/office/drawing/2014/main" id="{AC9AE41B-401A-2746-80D0-244CA64D279E}"/>
+              </a:ext>
+            </a:extLst>
+          </p:cNvPr>
+          <p:cNvSpPr>
+            <a:spLocks noGrp="1"/>
+          </p:cNvSpPr>
+          <p:nvPr>
+            <p:ph type="title"/>
+          </p:nvPr>
+        </p:nvSpPr>
+        <p:spPr/>
+        <p:txBody>
+          <a:bodyPr/>
+          <a:lstStyle/>
+          <a:p>
+            <a:r>
+              <a:rPr lang="en-US" dirty="0"/>
+              <a:t>Gaussian Elimination example</a:t>
+            </a:r>
+          </a:p>
+        </p:txBody>
+      </p:sp>
+      <p:sp>
+        <p:nvSpPr>
           <p:cNvPr id="3" name="Text Box 5">
             <a:extLst>
               <a:ext uri="{FF2B5EF4-FFF2-40B4-BE49-F238E27FC236}">
@@ -4267,7 +4616,7 @@
 </p:sld>
 </file>
 
-<file path=ppt/slides/slide11.xml><?xml version="1.0" encoding="utf-8"?>
+<file path=ppt/slides/slide12.xml><?xml version="1.0" encoding="utf-8"?>
 <p:sld xmlns:a="http://schemas.openxmlformats.org/drawingml/2006/main" xmlns:r="http://schemas.openxmlformats.org/officeDocument/2006/relationships" xmlns:p="http://schemas.openxmlformats.org/presentationml/2006/main">
   <p:cSld>
     <p:spTree>
@@ -4546,539 +4895,6 @@
 </p:sld>
 </file>
 
-<file path=ppt/slides/slide12.xml><?xml version="1.0" encoding="utf-8"?>
-<p:sld xmlns:a="http://schemas.openxmlformats.org/drawingml/2006/main" xmlns:r="http://schemas.openxmlformats.org/officeDocument/2006/relationships" xmlns:p="http://schemas.openxmlformats.org/presentationml/2006/main">
-  <p:cSld>
-    <p:spTree>
-      <p:nvGrpSpPr>
-        <p:cNvPr id="1" name=""/>
-        <p:cNvGrpSpPr/>
-        <p:nvPr/>
-      </p:nvGrpSpPr>
-      <p:grpSpPr>
-        <a:xfrm>
-          <a:off x="0" y="0"/>
-          <a:ext cx="0" cy="0"/>
-          <a:chOff x="0" y="0"/>
-          <a:chExt cx="0" cy="0"/>
-        </a:xfrm>
-      </p:grpSpPr>
-      <p:sp>
-        <p:nvSpPr>
-          <p:cNvPr id="2" name="Title 1">
-            <a:extLst>
-              <a:ext uri="{FF2B5EF4-FFF2-40B4-BE49-F238E27FC236}">
-                <a16:creationId xmlns:a16="http://schemas.microsoft.com/office/drawing/2014/main" id="{AC9AE41B-401A-2746-80D0-244CA64D279E}"/>
-              </a:ext>
-            </a:extLst>
-          </p:cNvPr>
-          <p:cNvSpPr>
-            <a:spLocks noGrp="1"/>
-          </p:cNvSpPr>
-          <p:nvPr>
-            <p:ph type="title"/>
-          </p:nvPr>
-        </p:nvSpPr>
-        <p:spPr/>
-        <p:txBody>
-          <a:bodyPr/>
-          <a:lstStyle/>
-          <a:p>
-            <a:r>
-              <a:rPr lang="en-US" dirty="0"/>
-              <a:t>Gaussian Elimination example</a:t>
-            </a:r>
-          </a:p>
-        </p:txBody>
-      </p:sp>
-      <p:sp>
-        <p:nvSpPr>
-          <p:cNvPr id="3" name="Text Box 4">
-            <a:extLst>
-              <a:ext uri="{FF2B5EF4-FFF2-40B4-BE49-F238E27FC236}">
-                <a16:creationId xmlns:a16="http://schemas.microsoft.com/office/drawing/2014/main" id="{AF8F256E-2012-DC4B-AA71-892935A3EBB6}"/>
-              </a:ext>
-            </a:extLst>
-          </p:cNvPr>
-          <p:cNvSpPr txBox="1">
-            <a:spLocks noChangeArrowheads="1"/>
-          </p:cNvSpPr>
-          <p:nvPr/>
-        </p:nvSpPr>
-        <p:spPr bwMode="auto">
-          <a:xfrm>
-            <a:off x="2674939" y="1279526"/>
-            <a:ext cx="6734175" cy="4359275"/>
-          </a:xfrm>
-          <a:prstGeom prst="rect">
-            <a:avLst/>
-          </a:prstGeom>
-          <a:noFill/>
-          <a:ln>
-            <a:noFill/>
-          </a:ln>
-          <a:effectLst/>
-          <a:extLst>
-            <a:ext uri="{909E8E84-426E-40dd-AFC4-6F175D3DCCD1}">
-              <a14:hiddenFill xmlns="" xmlns:a14="http://schemas.microsoft.com/office/drawing/2010/main">
-                <a:solidFill>
-                  <a:schemeClr val="accent1"/>
-                </a:solidFill>
-              </a14:hiddenFill>
-            </a:ext>
-            <a:ext uri="{91240B29-F687-4f45-9708-019B960494DF}">
-              <a14:hiddenLine xmlns="" xmlns:a14="http://schemas.microsoft.com/office/drawing/2010/main" w="9525">
-                <a:solidFill>
-                  <a:schemeClr val="tx1"/>
-                </a:solidFill>
-                <a:miter lim="800000"/>
-                <a:headEnd/>
-                <a:tailEnd/>
-              </a14:hiddenLine>
-            </a:ext>
-            <a:ext uri="{AF507438-7753-43e0-B8FC-AC1667EBCBE1}">
-              <a14:hiddenEffects xmlns="" xmlns:a14="http://schemas.microsoft.com/office/drawing/2010/main">
-                <a:effectLst>
-                  <a:outerShdw blurRad="63500" dist="38099" dir="2700000" algn="ctr" rotWithShape="0">
-                    <a:schemeClr val="bg2">
-                      <a:alpha val="74998"/>
-                    </a:schemeClr>
-                  </a:outerShdw>
-                </a:effectLst>
-              </a14:hiddenEffects>
-            </a:ext>
-          </a:extLst>
-        </p:spPr>
-        <p:txBody>
-          <a:bodyPr>
-            <a:spAutoFit/>
-          </a:bodyPr>
-          <a:lstStyle>
-            <a:lvl1pPr eaLnBrk="0" hangingPunct="0">
-              <a:defRPr>
-                <a:solidFill>
-                  <a:schemeClr val="tx1"/>
-                </a:solidFill>
-                <a:latin typeface="Arial" charset="0"/>
-                <a:ea typeface="ＭＳ Ｐゴシック" charset="0"/>
-              </a:defRPr>
-            </a:lvl1pPr>
-            <a:lvl2pPr marL="742950" indent="-285750" eaLnBrk="0" hangingPunct="0">
-              <a:defRPr>
-                <a:solidFill>
-                  <a:schemeClr val="tx1"/>
-                </a:solidFill>
-                <a:latin typeface="Arial" charset="0"/>
-                <a:ea typeface="ＭＳ Ｐゴシック" charset="0"/>
-              </a:defRPr>
-            </a:lvl2pPr>
-            <a:lvl3pPr marL="1143000" indent="-228600" eaLnBrk="0" hangingPunct="0">
-              <a:defRPr>
-                <a:solidFill>
-                  <a:schemeClr val="tx1"/>
-                </a:solidFill>
-                <a:latin typeface="Arial" charset="0"/>
-                <a:ea typeface="ＭＳ Ｐゴシック" charset="0"/>
-              </a:defRPr>
-            </a:lvl3pPr>
-            <a:lvl4pPr marL="1600200" indent="-228600" eaLnBrk="0" hangingPunct="0">
-              <a:defRPr>
-                <a:solidFill>
-                  <a:schemeClr val="tx1"/>
-                </a:solidFill>
-                <a:latin typeface="Arial" charset="0"/>
-                <a:ea typeface="ＭＳ Ｐゴシック" charset="0"/>
-              </a:defRPr>
-            </a:lvl4pPr>
-            <a:lvl5pPr marL="2057400" indent="-228600" eaLnBrk="0" hangingPunct="0">
-              <a:defRPr>
-                <a:solidFill>
-                  <a:schemeClr val="tx1"/>
-                </a:solidFill>
-                <a:latin typeface="Arial" charset="0"/>
-                <a:ea typeface="ＭＳ Ｐゴシック" charset="0"/>
-              </a:defRPr>
-            </a:lvl5pPr>
-            <a:lvl6pPr marL="2514600" indent="-228600" eaLnBrk="0" fontAlgn="base" hangingPunct="0">
-              <a:spcBef>
-                <a:spcPct val="0"/>
-              </a:spcBef>
-              <a:spcAft>
-                <a:spcPct val="0"/>
-              </a:spcAft>
-              <a:defRPr>
-                <a:solidFill>
-                  <a:schemeClr val="tx1"/>
-                </a:solidFill>
-                <a:latin typeface="Arial" charset="0"/>
-                <a:ea typeface="ＭＳ Ｐゴシック" charset="0"/>
-              </a:defRPr>
-            </a:lvl6pPr>
-            <a:lvl7pPr marL="2971800" indent="-228600" eaLnBrk="0" fontAlgn="base" hangingPunct="0">
-              <a:spcBef>
-                <a:spcPct val="0"/>
-              </a:spcBef>
-              <a:spcAft>
-                <a:spcPct val="0"/>
-              </a:spcAft>
-              <a:defRPr>
-                <a:solidFill>
-                  <a:schemeClr val="tx1"/>
-                </a:solidFill>
-                <a:latin typeface="Arial" charset="0"/>
-                <a:ea typeface="ＭＳ Ｐゴシック" charset="0"/>
-              </a:defRPr>
-            </a:lvl7pPr>
-            <a:lvl8pPr marL="3429000" indent="-228600" eaLnBrk="0" fontAlgn="base" hangingPunct="0">
-              <a:spcBef>
-                <a:spcPct val="0"/>
-              </a:spcBef>
-              <a:spcAft>
-                <a:spcPct val="0"/>
-              </a:spcAft>
-              <a:defRPr>
-                <a:solidFill>
-                  <a:schemeClr val="tx1"/>
-                </a:solidFill>
-                <a:latin typeface="Arial" charset="0"/>
-                <a:ea typeface="ＭＳ Ｐゴシック" charset="0"/>
-              </a:defRPr>
-            </a:lvl8pPr>
-            <a:lvl9pPr marL="3886200" indent="-228600" eaLnBrk="0" fontAlgn="base" hangingPunct="0">
-              <a:spcBef>
-                <a:spcPct val="0"/>
-              </a:spcBef>
-              <a:spcAft>
-                <a:spcPct val="0"/>
-              </a:spcAft>
-              <a:defRPr>
-                <a:solidFill>
-                  <a:schemeClr val="tx1"/>
-                </a:solidFill>
-                <a:latin typeface="Arial" charset="0"/>
-                <a:ea typeface="ＭＳ Ｐゴシック" charset="0"/>
-              </a:defRPr>
-            </a:lvl9pPr>
-          </a:lstStyle>
-          <a:p>
-            <a:pPr eaLnBrk="1" hangingPunct="1">
-              <a:defRPr/>
-            </a:pPr>
-            <a:r>
-              <a:rPr lang="en-US" sz="2000" dirty="0">
-                <a:solidFill>
-                  <a:schemeClr val="bg1"/>
-                </a:solidFill>
-                <a:cs typeface="+mn-cs"/>
-              </a:rPr>
-              <a:t>Solve as follows:</a:t>
-            </a:r>
-          </a:p>
-          <a:p>
-            <a:pPr eaLnBrk="1" hangingPunct="1">
-              <a:defRPr/>
-            </a:pPr>
-            <a:endParaRPr lang="en-US" sz="2000" dirty="0">
-              <a:solidFill>
-                <a:schemeClr val="bg1"/>
-              </a:solidFill>
-              <a:cs typeface="+mn-cs"/>
-            </a:endParaRPr>
-          </a:p>
-          <a:p>
-            <a:pPr eaLnBrk="1" hangingPunct="1">
-              <a:defRPr/>
-            </a:pPr>
-            <a:r>
-              <a:rPr lang="en-US" sz="2000" dirty="0">
-                <a:solidFill>
-                  <a:schemeClr val="bg1"/>
-                </a:solidFill>
-                <a:cs typeface="+mn-cs"/>
-              </a:rPr>
-              <a:t>From equation 3,</a:t>
-            </a:r>
-          </a:p>
-          <a:p>
-            <a:pPr eaLnBrk="1" hangingPunct="1">
-              <a:defRPr/>
-            </a:pPr>
-            <a:r>
-              <a:rPr lang="en-US" sz="2000" dirty="0">
-                <a:solidFill>
-                  <a:srgbClr val="FFFF00"/>
-                </a:solidFill>
-                <a:latin typeface="Courier New"/>
-                <a:cs typeface="Courier New"/>
-              </a:rPr>
-              <a:t>z = 4</a:t>
-            </a:r>
-            <a:r>
-              <a:rPr lang="en-US" sz="2000" dirty="0">
-                <a:solidFill>
-                  <a:srgbClr val="FFFF00"/>
-                </a:solidFill>
-                <a:cs typeface="+mn-cs"/>
-              </a:rPr>
-              <a:t>.</a:t>
-            </a:r>
-          </a:p>
-          <a:p>
-            <a:pPr eaLnBrk="1" hangingPunct="1">
-              <a:defRPr/>
-            </a:pPr>
-            <a:endParaRPr lang="en-US" sz="2000" dirty="0">
-              <a:solidFill>
-                <a:srgbClr val="FFFF00"/>
-              </a:solidFill>
-              <a:cs typeface="+mn-cs"/>
-            </a:endParaRPr>
-          </a:p>
-          <a:p>
-            <a:pPr eaLnBrk="1" hangingPunct="1">
-              <a:defRPr/>
-            </a:pPr>
-            <a:r>
-              <a:rPr lang="en-US" sz="2000" dirty="0">
-                <a:solidFill>
-                  <a:schemeClr val="bg1"/>
-                </a:solidFill>
-                <a:cs typeface="+mn-cs"/>
-              </a:rPr>
-              <a:t>Substituting </a:t>
-            </a:r>
-            <a:r>
-              <a:rPr lang="en-US" sz="2000" dirty="0">
-                <a:solidFill>
-                  <a:schemeClr val="bg1"/>
-                </a:solidFill>
-                <a:latin typeface="Courier New"/>
-                <a:cs typeface="Courier New"/>
-              </a:rPr>
-              <a:t>z = 4</a:t>
-            </a:r>
-            <a:r>
-              <a:rPr lang="en-US" sz="2000" dirty="0">
-                <a:solidFill>
-                  <a:schemeClr val="bg1"/>
-                </a:solidFill>
-                <a:cs typeface="+mn-cs"/>
-              </a:rPr>
-              <a:t> into equation 2 gives an equation in which we can solve for </a:t>
-            </a:r>
-            <a:r>
-              <a:rPr lang="en-US" sz="2000" dirty="0">
-                <a:solidFill>
-                  <a:schemeClr val="bg1"/>
-                </a:solidFill>
-                <a:latin typeface="Courier New"/>
-                <a:cs typeface="Courier New"/>
-              </a:rPr>
-              <a:t>y</a:t>
-            </a:r>
-            <a:r>
-              <a:rPr lang="en-US" sz="2000" dirty="0">
-                <a:solidFill>
-                  <a:schemeClr val="bg1"/>
-                </a:solidFill>
-                <a:cs typeface="+mn-cs"/>
-              </a:rPr>
-              <a:t>.</a:t>
-            </a:r>
-          </a:p>
-          <a:p>
-            <a:pPr eaLnBrk="1" hangingPunct="1">
-              <a:defRPr/>
-            </a:pPr>
-            <a:r>
-              <a:rPr lang="en-US" sz="2000" dirty="0">
-                <a:solidFill>
-                  <a:schemeClr val="bg1"/>
-                </a:solidFill>
-                <a:latin typeface="Courier New"/>
-                <a:cs typeface="Courier New"/>
-              </a:rPr>
-              <a:t>y + 2 (4) = 11</a:t>
-            </a:r>
-            <a:r>
-              <a:rPr lang="en-US" sz="2000" dirty="0">
-                <a:solidFill>
-                  <a:schemeClr val="bg1"/>
-                </a:solidFill>
-                <a:cs typeface="+mn-cs"/>
-              </a:rPr>
-              <a:t>, and therefore</a:t>
-            </a:r>
-          </a:p>
-          <a:p>
-            <a:pPr eaLnBrk="1" hangingPunct="1">
-              <a:defRPr/>
-            </a:pPr>
-            <a:r>
-              <a:rPr lang="en-US" sz="2000" dirty="0">
-                <a:solidFill>
-                  <a:srgbClr val="FFFF00"/>
-                </a:solidFill>
-                <a:latin typeface="Courier New"/>
-                <a:cs typeface="Courier New"/>
-              </a:rPr>
-              <a:t>y = 3</a:t>
-            </a:r>
-            <a:r>
-              <a:rPr lang="en-US" sz="2000" dirty="0">
-                <a:solidFill>
-                  <a:srgbClr val="FFFF00"/>
-                </a:solidFill>
-                <a:cs typeface="+mn-cs"/>
-              </a:rPr>
-              <a:t>.</a:t>
-            </a:r>
-          </a:p>
-          <a:p>
-            <a:pPr eaLnBrk="1" hangingPunct="1">
-              <a:defRPr/>
-            </a:pPr>
-            <a:endParaRPr lang="en-US" sz="2000" dirty="0">
-              <a:solidFill>
-                <a:srgbClr val="FFFF00"/>
-              </a:solidFill>
-              <a:cs typeface="+mn-cs"/>
-            </a:endParaRPr>
-          </a:p>
-          <a:p>
-            <a:pPr eaLnBrk="1" hangingPunct="1">
-              <a:defRPr/>
-            </a:pPr>
-            <a:r>
-              <a:rPr lang="en-US" sz="2000" dirty="0">
-                <a:solidFill>
-                  <a:schemeClr val="bg1"/>
-                </a:solidFill>
-                <a:cs typeface="+mn-cs"/>
-              </a:rPr>
-              <a:t>Substituting </a:t>
-            </a:r>
-            <a:r>
-              <a:rPr lang="en-US" sz="2000" dirty="0">
-                <a:solidFill>
-                  <a:schemeClr val="bg1"/>
-                </a:solidFill>
-                <a:latin typeface="Courier New"/>
-                <a:cs typeface="Courier New"/>
-              </a:rPr>
-              <a:t>z = 4 </a:t>
-            </a:r>
-            <a:r>
-              <a:rPr lang="en-US" sz="2000" dirty="0">
-                <a:solidFill>
-                  <a:schemeClr val="bg1"/>
-                </a:solidFill>
-                <a:cs typeface="+mn-cs"/>
-              </a:rPr>
-              <a:t>and </a:t>
-            </a:r>
-            <a:r>
-              <a:rPr lang="en-US" sz="2000" dirty="0">
-                <a:solidFill>
-                  <a:schemeClr val="bg1"/>
-                </a:solidFill>
-                <a:latin typeface="Courier New"/>
-                <a:cs typeface="Courier New"/>
-              </a:rPr>
-              <a:t>y = 3 </a:t>
-            </a:r>
-            <a:r>
-              <a:rPr lang="en-US" sz="2000" dirty="0">
-                <a:solidFill>
-                  <a:schemeClr val="bg1"/>
-                </a:solidFill>
-                <a:cs typeface="+mn-cs"/>
-              </a:rPr>
-              <a:t>into equation 1 gives an equation in which we can solve for </a:t>
-            </a:r>
-            <a:r>
-              <a:rPr lang="en-US" sz="2000" dirty="0">
-                <a:solidFill>
-                  <a:schemeClr val="bg1"/>
-                </a:solidFill>
-                <a:latin typeface="Courier New"/>
-                <a:cs typeface="Courier New"/>
-              </a:rPr>
-              <a:t>x</a:t>
-            </a:r>
-            <a:r>
-              <a:rPr lang="en-US" sz="2000" dirty="0">
-                <a:solidFill>
-                  <a:schemeClr val="bg1"/>
-                </a:solidFill>
-                <a:cs typeface="+mn-cs"/>
-              </a:rPr>
-              <a:t>.</a:t>
-            </a:r>
-          </a:p>
-          <a:p>
-            <a:pPr eaLnBrk="1" hangingPunct="1">
-              <a:defRPr/>
-            </a:pPr>
-            <a:r>
-              <a:rPr lang="en-US" sz="2000" dirty="0">
-                <a:solidFill>
-                  <a:schemeClr val="bg1"/>
-                </a:solidFill>
-                <a:latin typeface="Courier New"/>
-                <a:cs typeface="Courier New"/>
-              </a:rPr>
-              <a:t>x + 3/2 (3) + 2 (4) = 29/2</a:t>
-            </a:r>
-            <a:r>
-              <a:rPr lang="en-US" sz="2000" dirty="0">
-                <a:solidFill>
-                  <a:schemeClr val="bg1"/>
-                </a:solidFill>
-                <a:cs typeface="+mn-cs"/>
-              </a:rPr>
-              <a:t>, and therefore</a:t>
-            </a:r>
-          </a:p>
-          <a:p>
-            <a:pPr eaLnBrk="1" hangingPunct="1">
-              <a:defRPr/>
-            </a:pPr>
-            <a:r>
-              <a:rPr lang="en-US" sz="2000" dirty="0">
-                <a:solidFill>
-                  <a:srgbClr val="FFFF00"/>
-                </a:solidFill>
-                <a:latin typeface="Courier New"/>
-                <a:cs typeface="Courier New"/>
-              </a:rPr>
-              <a:t>x = 2</a:t>
-            </a:r>
-            <a:r>
-              <a:rPr lang="en-US" sz="2000" dirty="0">
-                <a:solidFill>
-                  <a:srgbClr val="FFFF00"/>
-                </a:solidFill>
-                <a:cs typeface="+mn-cs"/>
-              </a:rPr>
-              <a:t>.</a:t>
-            </a:r>
-          </a:p>
-        </p:txBody>
-      </p:sp>
-    </p:spTree>
-    <p:extLst>
-      <p:ext uri="{BB962C8B-B14F-4D97-AF65-F5344CB8AC3E}">
-        <p14:creationId xmlns:p14="http://schemas.microsoft.com/office/powerpoint/2010/main" val="3896092988"/>
-      </p:ext>
-    </p:extLst>
-  </p:cSld>
-  <p:clrMapOvr>
-    <a:masterClrMapping/>
-  </p:clrMapOvr>
-</p:sld>
-</file>
-
 <file path=ppt/slides/slide13.xml><?xml version="1.0" encoding="utf-8"?>
 <p:sld xmlns:a="http://schemas.openxmlformats.org/drawingml/2006/main" xmlns:r="http://schemas.openxmlformats.org/officeDocument/2006/relationships" xmlns:p="http://schemas.openxmlformats.org/presentationml/2006/main">
   <p:cSld>
@@ -5119,42 +4935,29 @@
           <a:p>
             <a:r>
               <a:rPr lang="en-US" dirty="0"/>
-              <a:t>Excellent Online Resources</a:t>
+              <a:t>Gaussian Elimination example</a:t>
             </a:r>
           </a:p>
         </p:txBody>
       </p:sp>
-      <p:pic>
-        <p:nvPicPr>
-          <p:cNvPr id="3" name="Picture 6">
+      <p:sp>
+        <p:nvSpPr>
+          <p:cNvPr id="3" name="Text Box 4">
             <a:extLst>
               <a:ext uri="{FF2B5EF4-FFF2-40B4-BE49-F238E27FC236}">
-                <a16:creationId xmlns:a16="http://schemas.microsoft.com/office/drawing/2014/main" id="{FDAC9B0B-DF02-144E-AEF8-C4D07A270F8B}"/>
+                <a16:creationId xmlns:a16="http://schemas.microsoft.com/office/drawing/2014/main" id="{AF8F256E-2012-DC4B-AA71-892935A3EBB6}"/>
               </a:ext>
             </a:extLst>
           </p:cNvPr>
-          <p:cNvPicPr>
-            <a:picLocks noChangeAspect="1" noChangeArrowheads="1"/>
-          </p:cNvPicPr>
+          <p:cNvSpPr txBox="1">
+            <a:spLocks noChangeArrowheads="1"/>
+          </p:cNvSpPr>
           <p:nvPr/>
-        </p:nvPicPr>
-        <p:blipFill>
-          <a:blip r:embed="rId2">
-            <a:extLst>
-              <a:ext uri="{28A0092B-C50C-407E-A947-70E740481C1C}">
-                <a14:useLocalDpi xmlns:a14="http://schemas.microsoft.com/office/drawing/2010/main" val="0"/>
-              </a:ext>
-            </a:extLst>
-          </a:blip>
-          <a:srcRect/>
-          <a:stretch>
-            <a:fillRect/>
-          </a:stretch>
-        </p:blipFill>
+        </p:nvSpPr>
         <p:spPr bwMode="auto">
           <a:xfrm>
-            <a:off x="1811338" y="1712913"/>
-            <a:ext cx="4076700" cy="3956050"/>
+            <a:off x="2674939" y="1279526"/>
+            <a:ext cx="6734175" cy="4359275"/>
           </a:xfrm>
           <a:prstGeom prst="rect">
             <a:avLst/>
@@ -5195,83 +4998,427 @@
             </a:ext>
           </a:extLst>
         </p:spPr>
-      </p:pic>
-      <p:pic>
-        <p:nvPicPr>
-          <p:cNvPr id="4" name="Picture 7">
-            <a:extLst>
-              <a:ext uri="{FF2B5EF4-FFF2-40B4-BE49-F238E27FC236}">
-                <a16:creationId xmlns:a16="http://schemas.microsoft.com/office/drawing/2014/main" id="{2A25CC8A-54B3-FB4C-9050-CB579256B95B}"/>
-              </a:ext>
-            </a:extLst>
-          </p:cNvPr>
-          <p:cNvPicPr>
-            <a:picLocks noChangeAspect="1" noChangeArrowheads="1"/>
-          </p:cNvPicPr>
-          <p:nvPr/>
-        </p:nvPicPr>
-        <p:blipFill>
-          <a:blip r:embed="rId3">
-            <a:extLst>
-              <a:ext uri="{28A0092B-C50C-407E-A947-70E740481C1C}">
-                <a14:useLocalDpi xmlns:a14="http://schemas.microsoft.com/office/drawing/2010/main" val="0"/>
-              </a:ext>
-            </a:extLst>
-          </a:blip>
-          <a:srcRect/>
-          <a:stretch>
-            <a:fillRect/>
-          </a:stretch>
-        </p:blipFill>
-        <p:spPr bwMode="auto">
-          <a:xfrm>
-            <a:off x="6096000" y="2098675"/>
-            <a:ext cx="4141788" cy="3213100"/>
-          </a:xfrm>
-          <a:prstGeom prst="rect">
-            <a:avLst/>
-          </a:prstGeom>
-          <a:noFill/>
-          <a:ln>
-            <a:noFill/>
-          </a:ln>
-          <a:effectLst/>
-          <a:extLst>
-            <a:ext uri="{909E8E84-426E-40dd-AFC4-6F175D3DCCD1}">
-              <a14:hiddenFill xmlns="" xmlns:a14="http://schemas.microsoft.com/office/drawing/2010/main">
-                <a:solidFill>
-                  <a:schemeClr val="accent1"/>
-                </a:solidFill>
-              </a14:hiddenFill>
-            </a:ext>
-            <a:ext uri="{91240B29-F687-4f45-9708-019B960494DF}">
-              <a14:hiddenLine xmlns="" xmlns:a14="http://schemas.microsoft.com/office/drawing/2010/main" w="9525">
+        <p:txBody>
+          <a:bodyPr>
+            <a:spAutoFit/>
+          </a:bodyPr>
+          <a:lstStyle>
+            <a:lvl1pPr eaLnBrk="0" hangingPunct="0">
+              <a:defRPr>
                 <a:solidFill>
                   <a:schemeClr val="tx1"/>
                 </a:solidFill>
-                <a:miter lim="800000"/>
-                <a:headEnd/>
-                <a:tailEnd/>
-              </a14:hiddenLine>
-            </a:ext>
-            <a:ext uri="{AF507438-7753-43e0-B8FC-AC1667EBCBE1}">
-              <a14:hiddenEffects xmlns="" xmlns:a14="http://schemas.microsoft.com/office/drawing/2010/main">
-                <a:effectLst>
-                  <a:outerShdw blurRad="63500" dist="38099" dir="2700000" algn="ctr" rotWithShape="0">
-                    <a:schemeClr val="bg2">
-                      <a:alpha val="74998"/>
-                    </a:schemeClr>
-                  </a:outerShdw>
-                </a:effectLst>
-              </a14:hiddenEffects>
-            </a:ext>
-          </a:extLst>
-        </p:spPr>
-      </p:pic>
+                <a:latin typeface="Arial" charset="0"/>
+                <a:ea typeface="ＭＳ Ｐゴシック" charset="0"/>
+              </a:defRPr>
+            </a:lvl1pPr>
+            <a:lvl2pPr marL="742950" indent="-285750" eaLnBrk="0" hangingPunct="0">
+              <a:defRPr>
+                <a:solidFill>
+                  <a:schemeClr val="tx1"/>
+                </a:solidFill>
+                <a:latin typeface="Arial" charset="0"/>
+                <a:ea typeface="ＭＳ Ｐゴシック" charset="0"/>
+              </a:defRPr>
+            </a:lvl2pPr>
+            <a:lvl3pPr marL="1143000" indent="-228600" eaLnBrk="0" hangingPunct="0">
+              <a:defRPr>
+                <a:solidFill>
+                  <a:schemeClr val="tx1"/>
+                </a:solidFill>
+                <a:latin typeface="Arial" charset="0"/>
+                <a:ea typeface="ＭＳ Ｐゴシック" charset="0"/>
+              </a:defRPr>
+            </a:lvl3pPr>
+            <a:lvl4pPr marL="1600200" indent="-228600" eaLnBrk="0" hangingPunct="0">
+              <a:defRPr>
+                <a:solidFill>
+                  <a:schemeClr val="tx1"/>
+                </a:solidFill>
+                <a:latin typeface="Arial" charset="0"/>
+                <a:ea typeface="ＭＳ Ｐゴシック" charset="0"/>
+              </a:defRPr>
+            </a:lvl4pPr>
+            <a:lvl5pPr marL="2057400" indent="-228600" eaLnBrk="0" hangingPunct="0">
+              <a:defRPr>
+                <a:solidFill>
+                  <a:schemeClr val="tx1"/>
+                </a:solidFill>
+                <a:latin typeface="Arial" charset="0"/>
+                <a:ea typeface="ＭＳ Ｐゴシック" charset="0"/>
+              </a:defRPr>
+            </a:lvl5pPr>
+            <a:lvl6pPr marL="2514600" indent="-228600" eaLnBrk="0" fontAlgn="base" hangingPunct="0">
+              <a:spcBef>
+                <a:spcPct val="0"/>
+              </a:spcBef>
+              <a:spcAft>
+                <a:spcPct val="0"/>
+              </a:spcAft>
+              <a:defRPr>
+                <a:solidFill>
+                  <a:schemeClr val="tx1"/>
+                </a:solidFill>
+                <a:latin typeface="Arial" charset="0"/>
+                <a:ea typeface="ＭＳ Ｐゴシック" charset="0"/>
+              </a:defRPr>
+            </a:lvl6pPr>
+            <a:lvl7pPr marL="2971800" indent="-228600" eaLnBrk="0" fontAlgn="base" hangingPunct="0">
+              <a:spcBef>
+                <a:spcPct val="0"/>
+              </a:spcBef>
+              <a:spcAft>
+                <a:spcPct val="0"/>
+              </a:spcAft>
+              <a:defRPr>
+                <a:solidFill>
+                  <a:schemeClr val="tx1"/>
+                </a:solidFill>
+                <a:latin typeface="Arial" charset="0"/>
+                <a:ea typeface="ＭＳ Ｐゴシック" charset="0"/>
+              </a:defRPr>
+            </a:lvl7pPr>
+            <a:lvl8pPr marL="3429000" indent="-228600" eaLnBrk="0" fontAlgn="base" hangingPunct="0">
+              <a:spcBef>
+                <a:spcPct val="0"/>
+              </a:spcBef>
+              <a:spcAft>
+                <a:spcPct val="0"/>
+              </a:spcAft>
+              <a:defRPr>
+                <a:solidFill>
+                  <a:schemeClr val="tx1"/>
+                </a:solidFill>
+                <a:latin typeface="Arial" charset="0"/>
+                <a:ea typeface="ＭＳ Ｐゴシック" charset="0"/>
+              </a:defRPr>
+            </a:lvl8pPr>
+            <a:lvl9pPr marL="3886200" indent="-228600" eaLnBrk="0" fontAlgn="base" hangingPunct="0">
+              <a:spcBef>
+                <a:spcPct val="0"/>
+              </a:spcBef>
+              <a:spcAft>
+                <a:spcPct val="0"/>
+              </a:spcAft>
+              <a:defRPr>
+                <a:solidFill>
+                  <a:schemeClr val="tx1"/>
+                </a:solidFill>
+                <a:latin typeface="Arial" charset="0"/>
+                <a:ea typeface="ＭＳ Ｐゴシック" charset="0"/>
+              </a:defRPr>
+            </a:lvl9pPr>
+          </a:lstStyle>
+          <a:p>
+            <a:pPr eaLnBrk="1" hangingPunct="1">
+              <a:defRPr/>
+            </a:pPr>
+            <a:r>
+              <a:rPr lang="en-US" sz="2000" dirty="0">
+                <a:solidFill>
+                  <a:schemeClr val="bg1"/>
+                </a:solidFill>
+                <a:cs typeface="+mn-cs"/>
+              </a:rPr>
+              <a:t>Solve as follows:</a:t>
+            </a:r>
+          </a:p>
+          <a:p>
+            <a:pPr eaLnBrk="1" hangingPunct="1">
+              <a:defRPr/>
+            </a:pPr>
+            <a:endParaRPr lang="en-US" sz="2000" dirty="0">
+              <a:solidFill>
+                <a:schemeClr val="bg1"/>
+              </a:solidFill>
+              <a:cs typeface="+mn-cs"/>
+            </a:endParaRPr>
+          </a:p>
+          <a:p>
+            <a:pPr eaLnBrk="1" hangingPunct="1">
+              <a:defRPr/>
+            </a:pPr>
+            <a:r>
+              <a:rPr lang="en-US" sz="2000" dirty="0">
+                <a:solidFill>
+                  <a:schemeClr val="bg1"/>
+                </a:solidFill>
+                <a:cs typeface="+mn-cs"/>
+              </a:rPr>
+              <a:t>From equation 3,</a:t>
+            </a:r>
+          </a:p>
+          <a:p>
+            <a:pPr eaLnBrk="1" hangingPunct="1">
+              <a:defRPr/>
+            </a:pPr>
+            <a:r>
+              <a:rPr lang="en-US" sz="2000" dirty="0">
+                <a:solidFill>
+                  <a:srgbClr val="FFFF00"/>
+                </a:solidFill>
+                <a:latin typeface="Courier New"/>
+                <a:cs typeface="Courier New"/>
+              </a:rPr>
+              <a:t>z = 4</a:t>
+            </a:r>
+            <a:r>
+              <a:rPr lang="en-US" sz="2000" dirty="0">
+                <a:solidFill>
+                  <a:srgbClr val="FFFF00"/>
+                </a:solidFill>
+                <a:cs typeface="+mn-cs"/>
+              </a:rPr>
+              <a:t>.</a:t>
+            </a:r>
+          </a:p>
+          <a:p>
+            <a:pPr eaLnBrk="1" hangingPunct="1">
+              <a:defRPr/>
+            </a:pPr>
+            <a:endParaRPr lang="en-US" sz="2000" dirty="0">
+              <a:solidFill>
+                <a:srgbClr val="FFFF00"/>
+              </a:solidFill>
+              <a:cs typeface="+mn-cs"/>
+            </a:endParaRPr>
+          </a:p>
+          <a:p>
+            <a:pPr eaLnBrk="1" hangingPunct="1">
+              <a:defRPr/>
+            </a:pPr>
+            <a:r>
+              <a:rPr lang="en-US" sz="2000" dirty="0">
+                <a:solidFill>
+                  <a:schemeClr val="bg1"/>
+                </a:solidFill>
+                <a:cs typeface="+mn-cs"/>
+              </a:rPr>
+              <a:t>Substituting </a:t>
+            </a:r>
+            <a:r>
+              <a:rPr lang="en-US" sz="2000" dirty="0">
+                <a:solidFill>
+                  <a:schemeClr val="bg1"/>
+                </a:solidFill>
+                <a:latin typeface="Courier New"/>
+                <a:cs typeface="Courier New"/>
+              </a:rPr>
+              <a:t>z = 4</a:t>
+            </a:r>
+            <a:r>
+              <a:rPr lang="en-US" sz="2000" dirty="0">
+                <a:solidFill>
+                  <a:schemeClr val="bg1"/>
+                </a:solidFill>
+                <a:cs typeface="+mn-cs"/>
+              </a:rPr>
+              <a:t> into equation 2 gives an equation in which we can solve for </a:t>
+            </a:r>
+            <a:r>
+              <a:rPr lang="en-US" sz="2000" dirty="0">
+                <a:solidFill>
+                  <a:schemeClr val="bg1"/>
+                </a:solidFill>
+                <a:latin typeface="Courier New"/>
+                <a:cs typeface="Courier New"/>
+              </a:rPr>
+              <a:t>y</a:t>
+            </a:r>
+            <a:r>
+              <a:rPr lang="en-US" sz="2000" dirty="0">
+                <a:solidFill>
+                  <a:schemeClr val="bg1"/>
+                </a:solidFill>
+                <a:cs typeface="+mn-cs"/>
+              </a:rPr>
+              <a:t>.</a:t>
+            </a:r>
+          </a:p>
+          <a:p>
+            <a:pPr eaLnBrk="1" hangingPunct="1">
+              <a:defRPr/>
+            </a:pPr>
+            <a:r>
+              <a:rPr lang="en-US" sz="2000" dirty="0">
+                <a:solidFill>
+                  <a:schemeClr val="bg1"/>
+                </a:solidFill>
+                <a:latin typeface="Courier New"/>
+                <a:cs typeface="Courier New"/>
+              </a:rPr>
+              <a:t>y + 2 (4) = 11</a:t>
+            </a:r>
+            <a:r>
+              <a:rPr lang="en-US" sz="2000" dirty="0">
+                <a:solidFill>
+                  <a:schemeClr val="bg1"/>
+                </a:solidFill>
+                <a:cs typeface="+mn-cs"/>
+              </a:rPr>
+              <a:t>, and therefore</a:t>
+            </a:r>
+          </a:p>
+          <a:p>
+            <a:pPr eaLnBrk="1" hangingPunct="1">
+              <a:defRPr/>
+            </a:pPr>
+            <a:r>
+              <a:rPr lang="en-US" sz="2000" dirty="0">
+                <a:solidFill>
+                  <a:srgbClr val="FFFF00"/>
+                </a:solidFill>
+                <a:latin typeface="Courier New"/>
+                <a:cs typeface="Courier New"/>
+              </a:rPr>
+              <a:t>y = 3</a:t>
+            </a:r>
+            <a:r>
+              <a:rPr lang="en-US" sz="2000" dirty="0">
+                <a:solidFill>
+                  <a:srgbClr val="FFFF00"/>
+                </a:solidFill>
+                <a:cs typeface="+mn-cs"/>
+              </a:rPr>
+              <a:t>.</a:t>
+            </a:r>
+          </a:p>
+          <a:p>
+            <a:pPr eaLnBrk="1" hangingPunct="1">
+              <a:defRPr/>
+            </a:pPr>
+            <a:endParaRPr lang="en-US" sz="2000" dirty="0">
+              <a:solidFill>
+                <a:srgbClr val="FFFF00"/>
+              </a:solidFill>
+              <a:cs typeface="+mn-cs"/>
+            </a:endParaRPr>
+          </a:p>
+          <a:p>
+            <a:pPr eaLnBrk="1" hangingPunct="1">
+              <a:defRPr/>
+            </a:pPr>
+            <a:r>
+              <a:rPr lang="en-US" sz="2000" dirty="0">
+                <a:solidFill>
+                  <a:schemeClr val="bg1"/>
+                </a:solidFill>
+                <a:cs typeface="+mn-cs"/>
+              </a:rPr>
+              <a:t>Substituting </a:t>
+            </a:r>
+            <a:r>
+              <a:rPr lang="en-US" sz="2000" dirty="0">
+                <a:solidFill>
+                  <a:schemeClr val="bg1"/>
+                </a:solidFill>
+                <a:latin typeface="Courier New"/>
+                <a:cs typeface="Courier New"/>
+              </a:rPr>
+              <a:t>z = 4 </a:t>
+            </a:r>
+            <a:r>
+              <a:rPr lang="en-US" sz="2000" dirty="0">
+                <a:solidFill>
+                  <a:schemeClr val="bg1"/>
+                </a:solidFill>
+                <a:cs typeface="+mn-cs"/>
+              </a:rPr>
+              <a:t>and </a:t>
+            </a:r>
+            <a:r>
+              <a:rPr lang="en-US" sz="2000" dirty="0">
+                <a:solidFill>
+                  <a:schemeClr val="bg1"/>
+                </a:solidFill>
+                <a:latin typeface="Courier New"/>
+                <a:cs typeface="Courier New"/>
+              </a:rPr>
+              <a:t>y = 3 </a:t>
+            </a:r>
+            <a:r>
+              <a:rPr lang="en-US" sz="2000" dirty="0">
+                <a:solidFill>
+                  <a:schemeClr val="bg1"/>
+                </a:solidFill>
+                <a:cs typeface="+mn-cs"/>
+              </a:rPr>
+              <a:t>into equation 1 gives an equation in which we can solve for </a:t>
+            </a:r>
+            <a:r>
+              <a:rPr lang="en-US" sz="2000" dirty="0">
+                <a:solidFill>
+                  <a:schemeClr val="bg1"/>
+                </a:solidFill>
+                <a:latin typeface="Courier New"/>
+                <a:cs typeface="Courier New"/>
+              </a:rPr>
+              <a:t>x</a:t>
+            </a:r>
+            <a:r>
+              <a:rPr lang="en-US" sz="2000" dirty="0">
+                <a:solidFill>
+                  <a:schemeClr val="bg1"/>
+                </a:solidFill>
+                <a:cs typeface="+mn-cs"/>
+              </a:rPr>
+              <a:t>.</a:t>
+            </a:r>
+          </a:p>
+          <a:p>
+            <a:pPr eaLnBrk="1" hangingPunct="1">
+              <a:defRPr/>
+            </a:pPr>
+            <a:r>
+              <a:rPr lang="en-US" sz="2000" dirty="0">
+                <a:solidFill>
+                  <a:schemeClr val="bg1"/>
+                </a:solidFill>
+                <a:latin typeface="Courier New"/>
+                <a:cs typeface="Courier New"/>
+              </a:rPr>
+              <a:t>x + 3/2 (3) + 2 (4) = 29/2</a:t>
+            </a:r>
+            <a:r>
+              <a:rPr lang="en-US" sz="2000" dirty="0">
+                <a:solidFill>
+                  <a:schemeClr val="bg1"/>
+                </a:solidFill>
+                <a:cs typeface="+mn-cs"/>
+              </a:rPr>
+              <a:t>, and therefore</a:t>
+            </a:r>
+          </a:p>
+          <a:p>
+            <a:pPr eaLnBrk="1" hangingPunct="1">
+              <a:defRPr/>
+            </a:pPr>
+            <a:r>
+              <a:rPr lang="en-US" sz="2000" dirty="0">
+                <a:solidFill>
+                  <a:srgbClr val="FFFF00"/>
+                </a:solidFill>
+                <a:latin typeface="Courier New"/>
+                <a:cs typeface="Courier New"/>
+              </a:rPr>
+              <a:t>x = 2</a:t>
+            </a:r>
+            <a:r>
+              <a:rPr lang="en-US" sz="2000" dirty="0">
+                <a:solidFill>
+                  <a:srgbClr val="FFFF00"/>
+                </a:solidFill>
+                <a:cs typeface="+mn-cs"/>
+              </a:rPr>
+              <a:t>.</a:t>
+            </a:r>
+          </a:p>
+        </p:txBody>
+      </p:sp>
     </p:spTree>
     <p:extLst>
       <p:ext uri="{BB962C8B-B14F-4D97-AF65-F5344CB8AC3E}">
-        <p14:creationId xmlns:p14="http://schemas.microsoft.com/office/powerpoint/2010/main" val="2366030639"/>
+        <p14:creationId xmlns:p14="http://schemas.microsoft.com/office/powerpoint/2010/main" val="3896092988"/>
       </p:ext>
     </p:extLst>
   </p:cSld>
@@ -5492,6 +5639,111 @@
             <a:r>
               <a:rPr lang="en-US" dirty="0"/>
               <a:t>Non-linear terms are handled automatically</a:t>
+            </a:r>
+          </a:p>
+        </p:txBody>
+      </p:sp>
+      <p:pic>
+        <p:nvPicPr>
+          <p:cNvPr id="4" name="Picture 3">
+            <a:extLst>
+              <a:ext uri="{FF2B5EF4-FFF2-40B4-BE49-F238E27FC236}">
+                <a16:creationId xmlns:a16="http://schemas.microsoft.com/office/drawing/2014/main" id="{9D8A3637-FC5E-2941-7458-951357B27C22}"/>
+              </a:ext>
+            </a:extLst>
+          </p:cNvPr>
+          <p:cNvPicPr>
+            <a:picLocks noChangeAspect="1"/>
+          </p:cNvPicPr>
+          <p:nvPr/>
+        </p:nvPicPr>
+        <p:blipFill>
+          <a:blip r:embed="rId2"/>
+          <a:stretch>
+            <a:fillRect/>
+          </a:stretch>
+        </p:blipFill>
+        <p:spPr>
+          <a:xfrm>
+            <a:off x="213775" y="3619500"/>
+            <a:ext cx="6815675" cy="2039037"/>
+          </a:xfrm>
+          <a:prstGeom prst="rect">
+            <a:avLst/>
+          </a:prstGeom>
+        </p:spPr>
+      </p:pic>
+      <p:pic>
+        <p:nvPicPr>
+          <p:cNvPr id="5" name="Picture 4" descr="latex-image-1.pdf">
+            <a:extLst>
+              <a:ext uri="{FF2B5EF4-FFF2-40B4-BE49-F238E27FC236}">
+                <a16:creationId xmlns:a16="http://schemas.microsoft.com/office/drawing/2014/main" id="{E31FB40B-FC21-ACA3-CACB-42CA92B64062}"/>
+              </a:ext>
+            </a:extLst>
+          </p:cNvPr>
+          <p:cNvPicPr>
+            <a:picLocks noChangeAspect="1"/>
+          </p:cNvPicPr>
+          <p:nvPr/>
+        </p:nvPicPr>
+        <p:blipFill>
+          <a:blip r:embed="rId3">
+            <a:extLst>
+              <a:ext uri="{28A0092B-C50C-407E-A947-70E740481C1C}">
+                <a14:useLocalDpi xmlns:a14="http://schemas.microsoft.com/office/drawing/2010/main" val="0"/>
+              </a:ext>
+            </a:extLst>
+          </a:blip>
+          <a:stretch>
+            <a:fillRect/>
+          </a:stretch>
+        </p:blipFill>
+        <p:spPr>
+          <a:xfrm>
+            <a:off x="8427168" y="3619500"/>
+            <a:ext cx="3449457" cy="1273014"/>
+          </a:xfrm>
+          <a:prstGeom prst="rect">
+            <a:avLst/>
+          </a:prstGeom>
+        </p:spPr>
+      </p:pic>
+      <p:sp>
+        <p:nvSpPr>
+          <p:cNvPr id="6" name="TextBox 5">
+            <a:extLst>
+              <a:ext uri="{FF2B5EF4-FFF2-40B4-BE49-F238E27FC236}">
+                <a16:creationId xmlns:a16="http://schemas.microsoft.com/office/drawing/2014/main" id="{372D3FA6-0FED-EC52-72A1-A574F5C37E41}"/>
+              </a:ext>
+            </a:extLst>
+          </p:cNvPr>
+          <p:cNvSpPr txBox="1"/>
+          <p:nvPr/>
+        </p:nvSpPr>
+        <p:spPr>
+          <a:xfrm>
+            <a:off x="7292648" y="4184628"/>
+            <a:ext cx="840295" cy="707886"/>
+          </a:xfrm>
+          <a:prstGeom prst="rect">
+            <a:avLst/>
+          </a:prstGeom>
+          <a:noFill/>
+        </p:spPr>
+        <p:txBody>
+          <a:bodyPr wrap="none" rtlCol="0">
+            <a:spAutoFit/>
+          </a:bodyPr>
+          <a:lstStyle/>
+          <a:p>
+            <a:r>
+              <a:rPr lang="en-US" i="1" dirty="0">
+                <a:solidFill>
+                  <a:schemeClr val="bg1"/>
+                </a:solidFill>
+              </a:rPr>
+              <a:t>vs.</a:t>
             </a:r>
           </a:p>
         </p:txBody>
@@ -6381,276 +6633,259 @@
           <a:chExt cx="0" cy="0"/>
         </a:xfrm>
       </p:grpSpPr>
-      <p:pic>
-        <p:nvPicPr>
-          <p:cNvPr id="4" name="Picture 3" descr="latex-image-1.pdf">
+      <p:sp>
+        <p:nvSpPr>
+          <p:cNvPr id="2" name="Content Placeholder 2">
             <a:extLst>
               <a:ext uri="{FF2B5EF4-FFF2-40B4-BE49-F238E27FC236}">
-                <a16:creationId xmlns:a16="http://schemas.microsoft.com/office/drawing/2014/main" id="{06604E59-B71D-464E-B32A-9D118D55F85C}"/>
+                <a16:creationId xmlns:a16="http://schemas.microsoft.com/office/drawing/2014/main" id="{A3E8A9C7-FF38-F040-9223-BC08B55B6E24}"/>
               </a:ext>
             </a:extLst>
           </p:cNvPr>
-          <p:cNvPicPr>
-            <a:picLocks noChangeAspect="1"/>
-          </p:cNvPicPr>
+          <p:cNvSpPr txBox="1">
+            <a:spLocks/>
+          </p:cNvSpPr>
           <p:nvPr/>
-        </p:nvPicPr>
-        <p:blipFill>
-          <a:blip r:embed="rId2">
-            <a:extLst>
-              <a:ext uri="{28A0092B-C50C-407E-A947-70E740481C1C}">
-                <a14:useLocalDpi xmlns:a14="http://schemas.microsoft.com/office/drawing/2010/main" val="0"/>
-              </a:ext>
-            </a:extLst>
-          </a:blip>
-          <a:stretch>
-            <a:fillRect/>
-          </a:stretch>
-        </p:blipFill>
+        </p:nvSpPr>
         <p:spPr>
           <a:xfrm>
-            <a:off x="1739776" y="4964402"/>
-            <a:ext cx="4140200" cy="381000"/>
+            <a:off x="704193" y="1371600"/>
+            <a:ext cx="10804635" cy="4495800"/>
           </a:xfrm>
           <a:prstGeom prst="rect">
             <a:avLst/>
           </a:prstGeom>
         </p:spPr>
-      </p:pic>
-      <p:pic>
-        <p:nvPicPr>
-          <p:cNvPr id="5" name="Picture 4" descr="latex-image-1.pdf">
-            <a:extLst>
-              <a:ext uri="{FF2B5EF4-FFF2-40B4-BE49-F238E27FC236}">
-                <a16:creationId xmlns:a16="http://schemas.microsoft.com/office/drawing/2014/main" id="{BEACFB4F-4FBE-9B42-B529-8B5EE1F6F6B3}"/>
-              </a:ext>
-            </a:extLst>
-          </p:cNvPr>
-          <p:cNvPicPr>
-            <a:picLocks noChangeAspect="1"/>
-          </p:cNvPicPr>
-          <p:nvPr/>
-        </p:nvPicPr>
-        <p:blipFill>
-          <a:blip r:embed="rId3">
-            <a:extLst>
-              <a:ext uri="{28A0092B-C50C-407E-A947-70E740481C1C}">
-                <a14:useLocalDpi xmlns:a14="http://schemas.microsoft.com/office/drawing/2010/main" val="0"/>
-              </a:ext>
-            </a:extLst>
-          </a:blip>
-          <a:stretch>
-            <a:fillRect/>
-          </a:stretch>
-        </p:blipFill>
-        <p:spPr>
-          <a:xfrm>
-            <a:off x="6566900" y="4905164"/>
-            <a:ext cx="3556000" cy="431800"/>
-          </a:xfrm>
-          <a:prstGeom prst="rect">
-            <a:avLst/>
-          </a:prstGeom>
-        </p:spPr>
-      </p:pic>
-      <p:sp>
-        <p:nvSpPr>
-          <p:cNvPr id="6" name="TextBox 5">
-            <a:extLst>
-              <a:ext uri="{FF2B5EF4-FFF2-40B4-BE49-F238E27FC236}">
-                <a16:creationId xmlns:a16="http://schemas.microsoft.com/office/drawing/2014/main" id="{508A26AB-F0A3-2140-A3B5-7D91E94D4024}"/>
-              </a:ext>
-            </a:extLst>
-          </p:cNvPr>
-          <p:cNvSpPr txBox="1"/>
-          <p:nvPr/>
-        </p:nvSpPr>
-        <p:spPr>
-          <a:xfrm>
-            <a:off x="7590929" y="5453415"/>
-            <a:ext cx="1507945" cy="830997"/>
-          </a:xfrm>
-          <a:prstGeom prst="rect">
-            <a:avLst/>
-          </a:prstGeom>
-          <a:noFill/>
-        </p:spPr>
         <p:txBody>
-          <a:bodyPr wrap="none" rtlCol="0">
-            <a:spAutoFit/>
-          </a:bodyPr>
-          <a:lstStyle/>
-          <a:p>
-            <a:pPr algn="ctr"/>
-            <a:r>
-              <a:rPr lang="en-US" sz="1600" dirty="0">
-                <a:solidFill>
-                  <a:srgbClr val="FFFFFF"/>
-                </a:solidFill>
-              </a:rPr>
-              <a:t>Linear Algebra</a:t>
-            </a:r>
-          </a:p>
-          <a:p>
-            <a:pPr algn="ctr"/>
-            <a:r>
-              <a:rPr lang="en-US" sz="1600" dirty="0">
-                <a:solidFill>
-                  <a:srgbClr val="FFFFFF"/>
-                </a:solidFill>
-              </a:rPr>
-              <a:t>n equations</a:t>
-            </a:r>
-          </a:p>
-          <a:p>
-            <a:pPr algn="ctr"/>
-            <a:r>
-              <a:rPr lang="en-US" sz="1600" dirty="0">
-                <a:solidFill>
-                  <a:srgbClr val="FFFFFF"/>
-                </a:solidFill>
-              </a:rPr>
-              <a:t>n unknowns</a:t>
+          <a:bodyPr/>
+          <a:lstStyle>
+            <a:lvl1pPr marL="342900" indent="-342900" algn="l" rtl="0" eaLnBrk="0" fontAlgn="base" hangingPunct="0">
+              <a:spcBef>
+                <a:spcPct val="20000"/>
+              </a:spcBef>
+              <a:spcAft>
+                <a:spcPct val="0"/>
+              </a:spcAft>
+              <a:buClr>
+                <a:srgbClr val="FFFF99"/>
+              </a:buClr>
+              <a:buSzPct val="125000"/>
+              <a:buFont typeface="Wingdings" charset="0"/>
+              <a:buChar char="§"/>
+              <a:defRPr sz="2800" b="1">
+                <a:solidFill>
+                  <a:schemeClr val="bg1"/>
+                </a:solidFill>
+                <a:latin typeface="+mn-lt"/>
+                <a:ea typeface="+mn-ea"/>
+                <a:cs typeface="ＭＳ Ｐゴシック" charset="0"/>
+              </a:defRPr>
+            </a:lvl1pPr>
+            <a:lvl2pPr marL="742950" indent="-285750" algn="l" rtl="0" eaLnBrk="0" fontAlgn="base" hangingPunct="0">
+              <a:spcBef>
+                <a:spcPct val="20000"/>
+              </a:spcBef>
+              <a:spcAft>
+                <a:spcPct val="0"/>
+              </a:spcAft>
+              <a:buClr>
+                <a:srgbClr val="FFFF99"/>
+              </a:buClr>
+              <a:buSzPct val="125000"/>
+              <a:buFont typeface="Wingdings" charset="0"/>
+              <a:buChar char="§"/>
+              <a:defRPr sz="2400" b="1">
+                <a:solidFill>
+                  <a:schemeClr val="bg1"/>
+                </a:solidFill>
+                <a:latin typeface="+mn-lt"/>
+                <a:ea typeface="+mn-ea"/>
+              </a:defRPr>
+            </a:lvl2pPr>
+            <a:lvl3pPr marL="1143000" indent="-228600" algn="l" rtl="0" eaLnBrk="0" fontAlgn="base" hangingPunct="0">
+              <a:spcBef>
+                <a:spcPct val="20000"/>
+              </a:spcBef>
+              <a:spcAft>
+                <a:spcPct val="0"/>
+              </a:spcAft>
+              <a:buClr>
+                <a:srgbClr val="FFFF99"/>
+              </a:buClr>
+              <a:buSzPct val="125000"/>
+              <a:buFont typeface="Wingdings" charset="0"/>
+              <a:buChar char="§"/>
+              <a:defRPr sz="2000" b="1">
+                <a:solidFill>
+                  <a:schemeClr val="bg1"/>
+                </a:solidFill>
+                <a:latin typeface="+mn-lt"/>
+                <a:ea typeface="+mn-ea"/>
+              </a:defRPr>
+            </a:lvl3pPr>
+            <a:lvl4pPr marL="1600200" indent="-228600" algn="l" rtl="0" eaLnBrk="0" fontAlgn="base" hangingPunct="0">
+              <a:spcBef>
+                <a:spcPct val="20000"/>
+              </a:spcBef>
+              <a:spcAft>
+                <a:spcPct val="0"/>
+              </a:spcAft>
+              <a:buClr>
+                <a:srgbClr val="FFFF99"/>
+              </a:buClr>
+              <a:buSzPct val="125000"/>
+              <a:buFont typeface="Wingdings" charset="0"/>
+              <a:buChar char="§"/>
+              <a:defRPr b="1">
+                <a:solidFill>
+                  <a:schemeClr val="bg1"/>
+                </a:solidFill>
+                <a:latin typeface="+mn-lt"/>
+                <a:ea typeface="+mn-ea"/>
+              </a:defRPr>
+            </a:lvl4pPr>
+            <a:lvl5pPr marL="2057400" indent="-228600" algn="l" rtl="0" eaLnBrk="0" fontAlgn="base" hangingPunct="0">
+              <a:spcBef>
+                <a:spcPct val="20000"/>
+              </a:spcBef>
+              <a:spcAft>
+                <a:spcPct val="0"/>
+              </a:spcAft>
+              <a:buClr>
+                <a:srgbClr val="FFFF99"/>
+              </a:buClr>
+              <a:buSzPct val="125000"/>
+              <a:buFont typeface="Wingdings" charset="0"/>
+              <a:buChar char="§"/>
+              <a:defRPr b="1">
+                <a:solidFill>
+                  <a:schemeClr val="bg1"/>
+                </a:solidFill>
+                <a:latin typeface="+mn-lt"/>
+                <a:ea typeface="+mn-ea"/>
+              </a:defRPr>
+            </a:lvl5pPr>
+            <a:lvl6pPr marL="2514600" indent="-228600" algn="l" rtl="0" eaLnBrk="0" fontAlgn="base" hangingPunct="0">
+              <a:spcBef>
+                <a:spcPct val="20000"/>
+              </a:spcBef>
+              <a:spcAft>
+                <a:spcPct val="0"/>
+              </a:spcAft>
+              <a:buClr>
+                <a:srgbClr val="FFFF99"/>
+              </a:buClr>
+              <a:buSzPct val="125000"/>
+              <a:buFont typeface="Wingdings" charset="0"/>
+              <a:buChar char="§"/>
+              <a:defRPr b="1">
+                <a:solidFill>
+                  <a:schemeClr val="bg1"/>
+                </a:solidFill>
+                <a:latin typeface="+mn-lt"/>
+                <a:ea typeface="+mn-ea"/>
+              </a:defRPr>
+            </a:lvl6pPr>
+            <a:lvl7pPr marL="2971800" indent="-228600" algn="l" rtl="0" eaLnBrk="0" fontAlgn="base" hangingPunct="0">
+              <a:spcBef>
+                <a:spcPct val="20000"/>
+              </a:spcBef>
+              <a:spcAft>
+                <a:spcPct val="0"/>
+              </a:spcAft>
+              <a:buClr>
+                <a:srgbClr val="FFFF99"/>
+              </a:buClr>
+              <a:buSzPct val="125000"/>
+              <a:buFont typeface="Wingdings" charset="0"/>
+              <a:buChar char="§"/>
+              <a:defRPr b="1">
+                <a:solidFill>
+                  <a:schemeClr val="bg1"/>
+                </a:solidFill>
+                <a:latin typeface="+mn-lt"/>
+                <a:ea typeface="+mn-ea"/>
+              </a:defRPr>
+            </a:lvl7pPr>
+            <a:lvl8pPr marL="3429000" indent="-228600" algn="l" rtl="0" eaLnBrk="0" fontAlgn="base" hangingPunct="0">
+              <a:spcBef>
+                <a:spcPct val="20000"/>
+              </a:spcBef>
+              <a:spcAft>
+                <a:spcPct val="0"/>
+              </a:spcAft>
+              <a:buClr>
+                <a:srgbClr val="FFFF99"/>
+              </a:buClr>
+              <a:buSzPct val="125000"/>
+              <a:buFont typeface="Wingdings" charset="0"/>
+              <a:buChar char="§"/>
+              <a:defRPr b="1">
+                <a:solidFill>
+                  <a:schemeClr val="bg1"/>
+                </a:solidFill>
+                <a:latin typeface="+mn-lt"/>
+                <a:ea typeface="+mn-ea"/>
+              </a:defRPr>
+            </a:lvl8pPr>
+            <a:lvl9pPr marL="3886200" indent="-228600" algn="l" rtl="0" eaLnBrk="0" fontAlgn="base" hangingPunct="0">
+              <a:spcBef>
+                <a:spcPct val="20000"/>
+              </a:spcBef>
+              <a:spcAft>
+                <a:spcPct val="0"/>
+              </a:spcAft>
+              <a:buClr>
+                <a:srgbClr val="FFFF99"/>
+              </a:buClr>
+              <a:buSzPct val="125000"/>
+              <a:buFont typeface="Wingdings" charset="0"/>
+              <a:buChar char="§"/>
+              <a:defRPr b="1">
+                <a:solidFill>
+                  <a:schemeClr val="bg1"/>
+                </a:solidFill>
+                <a:latin typeface="+mn-lt"/>
+                <a:ea typeface="+mn-ea"/>
+              </a:defRPr>
+            </a:lvl9pPr>
+          </a:lstStyle>
+          <a:p>
+            <a:pPr marL="0" indent="0">
+              <a:buNone/>
+              <a:defRPr/>
+            </a:pPr>
+            <a:r>
+              <a:rPr lang="en-US" sz="3600" kern="0" dirty="0"/>
+              <a:t>Why do we need to know about matrix solution techniques?</a:t>
+            </a:r>
+          </a:p>
+          <a:p>
+            <a:pPr marL="0" indent="0">
+              <a:buNone/>
+              <a:defRPr/>
+            </a:pPr>
+            <a:r>
+              <a:rPr lang="en-US" sz="3600" kern="0" dirty="0"/>
+              <a:t> </a:t>
+            </a:r>
+          </a:p>
+          <a:p>
+            <a:pPr marL="466725" indent="0">
+              <a:buNone/>
+              <a:defRPr/>
+            </a:pPr>
+            <a:r>
+              <a:rPr lang="en-US" sz="3600" i="1" kern="0" dirty="0"/>
+              <a:t>Because matrix solutions to the flow equation using default parameters can fail to achieve convergence or can be modified to improve performance.</a:t>
             </a:r>
           </a:p>
         </p:txBody>
       </p:sp>
-      <p:sp>
-        <p:nvSpPr>
-          <p:cNvPr id="7" name="TextBox 6">
-            <a:extLst>
-              <a:ext uri="{FF2B5EF4-FFF2-40B4-BE49-F238E27FC236}">
-                <a16:creationId xmlns:a16="http://schemas.microsoft.com/office/drawing/2014/main" id="{23A7D9D8-0149-4843-AEF4-22978422146F}"/>
-              </a:ext>
-            </a:extLst>
-          </p:cNvPr>
-          <p:cNvSpPr txBox="1"/>
-          <p:nvPr/>
-        </p:nvSpPr>
-        <p:spPr>
-          <a:xfrm>
-            <a:off x="3324106" y="5453415"/>
-            <a:ext cx="971540" cy="830997"/>
-          </a:xfrm>
-          <a:prstGeom prst="rect">
-            <a:avLst/>
-          </a:prstGeom>
-          <a:noFill/>
-        </p:spPr>
-        <p:txBody>
-          <a:bodyPr wrap="none" rtlCol="0">
-            <a:spAutoFit/>
-          </a:bodyPr>
-          <a:lstStyle/>
-          <a:p>
-            <a:pPr algn="ctr"/>
-            <a:r>
-              <a:rPr lang="en-US" sz="1600" dirty="0">
-                <a:solidFill>
-                  <a:srgbClr val="FFFFFF"/>
-                </a:solidFill>
-              </a:rPr>
-              <a:t>Calculus</a:t>
-            </a:r>
-          </a:p>
-          <a:p>
-            <a:pPr algn="ctr"/>
-            <a:endParaRPr lang="en-US" sz="1600" dirty="0">
-              <a:solidFill>
-                <a:srgbClr val="FFFFFF"/>
-              </a:solidFill>
-            </a:endParaRPr>
-          </a:p>
-          <a:p>
-            <a:pPr algn="ctr"/>
-            <a:endParaRPr lang="en-US" sz="1600" dirty="0">
-              <a:solidFill>
-                <a:srgbClr val="FFFFFF"/>
-              </a:solidFill>
-            </a:endParaRPr>
-          </a:p>
-        </p:txBody>
-      </p:sp>
-      <p:pic>
-        <p:nvPicPr>
-          <p:cNvPr id="8" name="Picture 7" descr="gwf-fig2-9.pdf">
-            <a:extLst>
-              <a:ext uri="{FF2B5EF4-FFF2-40B4-BE49-F238E27FC236}">
-                <a16:creationId xmlns:a16="http://schemas.microsoft.com/office/drawing/2014/main" id="{084F5FDF-200E-D049-B880-5A65A5F7F40C}"/>
-              </a:ext>
-            </a:extLst>
-          </p:cNvPr>
-          <p:cNvPicPr>
-            <a:picLocks noChangeAspect="1"/>
-          </p:cNvPicPr>
-          <p:nvPr/>
-        </p:nvPicPr>
-        <p:blipFill rotWithShape="1">
-          <a:blip r:embed="rId4">
-            <a:extLst>
-              <a:ext uri="{28A0092B-C50C-407E-A947-70E740481C1C}">
-                <a14:useLocalDpi xmlns:a14="http://schemas.microsoft.com/office/drawing/2010/main" val="0"/>
-              </a:ext>
-            </a:extLst>
-          </a:blip>
-          <a:srcRect r="2812"/>
-          <a:stretch/>
-        </p:blipFill>
-        <p:spPr>
-          <a:xfrm>
-            <a:off x="6561352" y="610344"/>
-            <a:ext cx="3567096" cy="4114800"/>
-          </a:xfrm>
-          <a:prstGeom prst="rect">
-            <a:avLst/>
-          </a:prstGeom>
-          <a:solidFill>
-            <a:schemeClr val="bg1"/>
-          </a:solidFill>
-        </p:spPr>
-      </p:pic>
-      <p:pic>
-        <p:nvPicPr>
-          <p:cNvPr id="9" name="Picture 8" descr="gwf-fig2-9-aquifer.pdf">
-            <a:extLst>
-              <a:ext uri="{FF2B5EF4-FFF2-40B4-BE49-F238E27FC236}">
-                <a16:creationId xmlns:a16="http://schemas.microsoft.com/office/drawing/2014/main" id="{2CF18298-4881-5F45-B760-2C26AC98A568}"/>
-              </a:ext>
-            </a:extLst>
-          </p:cNvPr>
-          <p:cNvPicPr>
-            <a:picLocks noChangeAspect="1"/>
-          </p:cNvPicPr>
-          <p:nvPr/>
-        </p:nvPicPr>
-        <p:blipFill rotWithShape="1">
-          <a:blip r:embed="rId5">
-            <a:extLst>
-              <a:ext uri="{28A0092B-C50C-407E-A947-70E740481C1C}">
-                <a14:useLocalDpi xmlns:a14="http://schemas.microsoft.com/office/drawing/2010/main" val="0"/>
-              </a:ext>
-            </a:extLst>
-          </a:blip>
-          <a:srcRect l="-7614" t="-5597" r="-7139" b="-3065"/>
-          <a:stretch/>
-        </p:blipFill>
-        <p:spPr>
-          <a:xfrm>
-            <a:off x="2031876" y="584685"/>
-            <a:ext cx="3556000" cy="4098637"/>
-          </a:xfrm>
-          <a:prstGeom prst="rect">
-            <a:avLst/>
-          </a:prstGeom>
-          <a:solidFill>
-            <a:schemeClr val="bg1"/>
-          </a:solidFill>
-        </p:spPr>
-      </p:pic>
     </p:spTree>
     <p:extLst>
       <p:ext uri="{BB962C8B-B14F-4D97-AF65-F5344CB8AC3E}">
-        <p14:creationId xmlns:p14="http://schemas.microsoft.com/office/powerpoint/2010/main" val="528776625"/>
+        <p14:creationId xmlns:p14="http://schemas.microsoft.com/office/powerpoint/2010/main" val="2843997105"/>
       </p:ext>
     </p:extLst>
   </p:cSld>
@@ -10951,257 +11186,66 @@
       </p:grpSpPr>
       <p:sp>
         <p:nvSpPr>
-          <p:cNvPr id="2" name="Content Placeholder 2">
+          <p:cNvPr id="2" name="Title 1">
             <a:extLst>
               <a:ext uri="{FF2B5EF4-FFF2-40B4-BE49-F238E27FC236}">
-                <a16:creationId xmlns:a16="http://schemas.microsoft.com/office/drawing/2014/main" id="{A3E8A9C7-FF38-F040-9223-BC08B55B6E24}"/>
+                <a16:creationId xmlns:a16="http://schemas.microsoft.com/office/drawing/2014/main" id="{A92B926E-A820-AB77-C134-7909AE225825}"/>
               </a:ext>
             </a:extLst>
           </p:cNvPr>
-          <p:cNvSpPr txBox="1">
-            <a:spLocks/>
+          <p:cNvSpPr>
+            <a:spLocks noGrp="1"/>
           </p:cNvSpPr>
+          <p:nvPr>
+            <p:ph type="title"/>
+          </p:nvPr>
+        </p:nvSpPr>
+        <p:spPr/>
+        <p:txBody>
+          <a:bodyPr/>
+          <a:lstStyle/>
+          <a:p>
+            <a:r>
+              <a:rPr lang="en-US" dirty="0"/>
+              <a:t>MODFLOW System of Equations</a:t>
+            </a:r>
+          </a:p>
+        </p:txBody>
+      </p:sp>
+      <p:pic>
+        <p:nvPicPr>
+          <p:cNvPr id="8" name="Picture 7">
+            <a:extLst>
+              <a:ext uri="{FF2B5EF4-FFF2-40B4-BE49-F238E27FC236}">
+                <a16:creationId xmlns:a16="http://schemas.microsoft.com/office/drawing/2014/main" id="{45753859-3ED7-ACD1-A4AA-DBF64321B7A3}"/>
+              </a:ext>
+            </a:extLst>
+          </p:cNvPr>
+          <p:cNvPicPr>
+            <a:picLocks noChangeAspect="1"/>
+          </p:cNvPicPr>
           <p:nvPr/>
-        </p:nvSpPr>
+        </p:nvPicPr>
+        <p:blipFill>
+          <a:blip r:embed="rId3"/>
+          <a:stretch>
+            <a:fillRect/>
+          </a:stretch>
+        </p:blipFill>
         <p:spPr>
           <a:xfrm>
-            <a:off x="704193" y="1371600"/>
-            <a:ext cx="10804635" cy="4495800"/>
+            <a:off x="507999" y="1774907"/>
+            <a:ext cx="11057923" cy="3308186"/>
           </a:xfrm>
           <a:prstGeom prst="rect">
             <a:avLst/>
           </a:prstGeom>
         </p:spPr>
-        <p:txBody>
-          <a:bodyPr/>
-          <a:lstStyle>
-            <a:lvl1pPr marL="342900" indent="-342900" algn="l" rtl="0" eaLnBrk="0" fontAlgn="base" hangingPunct="0">
-              <a:spcBef>
-                <a:spcPct val="20000"/>
-              </a:spcBef>
-              <a:spcAft>
-                <a:spcPct val="0"/>
-              </a:spcAft>
-              <a:buClr>
-                <a:srgbClr val="FFFF99"/>
-              </a:buClr>
-              <a:buSzPct val="125000"/>
-              <a:buFont typeface="Wingdings" charset="0"/>
-              <a:buChar char="§"/>
-              <a:defRPr sz="2800" b="1">
-                <a:solidFill>
-                  <a:schemeClr val="bg1"/>
-                </a:solidFill>
-                <a:latin typeface="+mn-lt"/>
-                <a:ea typeface="+mn-ea"/>
-                <a:cs typeface="ＭＳ Ｐゴシック" charset="0"/>
-              </a:defRPr>
-            </a:lvl1pPr>
-            <a:lvl2pPr marL="742950" indent="-285750" algn="l" rtl="0" eaLnBrk="0" fontAlgn="base" hangingPunct="0">
-              <a:spcBef>
-                <a:spcPct val="20000"/>
-              </a:spcBef>
-              <a:spcAft>
-                <a:spcPct val="0"/>
-              </a:spcAft>
-              <a:buClr>
-                <a:srgbClr val="FFFF99"/>
-              </a:buClr>
-              <a:buSzPct val="125000"/>
-              <a:buFont typeface="Wingdings" charset="0"/>
-              <a:buChar char="§"/>
-              <a:defRPr sz="2400" b="1">
-                <a:solidFill>
-                  <a:schemeClr val="bg1"/>
-                </a:solidFill>
-                <a:latin typeface="+mn-lt"/>
-                <a:ea typeface="+mn-ea"/>
-              </a:defRPr>
-            </a:lvl2pPr>
-            <a:lvl3pPr marL="1143000" indent="-228600" algn="l" rtl="0" eaLnBrk="0" fontAlgn="base" hangingPunct="0">
-              <a:spcBef>
-                <a:spcPct val="20000"/>
-              </a:spcBef>
-              <a:spcAft>
-                <a:spcPct val="0"/>
-              </a:spcAft>
-              <a:buClr>
-                <a:srgbClr val="FFFF99"/>
-              </a:buClr>
-              <a:buSzPct val="125000"/>
-              <a:buFont typeface="Wingdings" charset="0"/>
-              <a:buChar char="§"/>
-              <a:defRPr sz="2000" b="1">
-                <a:solidFill>
-                  <a:schemeClr val="bg1"/>
-                </a:solidFill>
-                <a:latin typeface="+mn-lt"/>
-                <a:ea typeface="+mn-ea"/>
-              </a:defRPr>
-            </a:lvl3pPr>
-            <a:lvl4pPr marL="1600200" indent="-228600" algn="l" rtl="0" eaLnBrk="0" fontAlgn="base" hangingPunct="0">
-              <a:spcBef>
-                <a:spcPct val="20000"/>
-              </a:spcBef>
-              <a:spcAft>
-                <a:spcPct val="0"/>
-              </a:spcAft>
-              <a:buClr>
-                <a:srgbClr val="FFFF99"/>
-              </a:buClr>
-              <a:buSzPct val="125000"/>
-              <a:buFont typeface="Wingdings" charset="0"/>
-              <a:buChar char="§"/>
-              <a:defRPr b="1">
-                <a:solidFill>
-                  <a:schemeClr val="bg1"/>
-                </a:solidFill>
-                <a:latin typeface="+mn-lt"/>
-                <a:ea typeface="+mn-ea"/>
-              </a:defRPr>
-            </a:lvl4pPr>
-            <a:lvl5pPr marL="2057400" indent="-228600" algn="l" rtl="0" eaLnBrk="0" fontAlgn="base" hangingPunct="0">
-              <a:spcBef>
-                <a:spcPct val="20000"/>
-              </a:spcBef>
-              <a:spcAft>
-                <a:spcPct val="0"/>
-              </a:spcAft>
-              <a:buClr>
-                <a:srgbClr val="FFFF99"/>
-              </a:buClr>
-              <a:buSzPct val="125000"/>
-              <a:buFont typeface="Wingdings" charset="0"/>
-              <a:buChar char="§"/>
-              <a:defRPr b="1">
-                <a:solidFill>
-                  <a:schemeClr val="bg1"/>
-                </a:solidFill>
-                <a:latin typeface="+mn-lt"/>
-                <a:ea typeface="+mn-ea"/>
-              </a:defRPr>
-            </a:lvl5pPr>
-            <a:lvl6pPr marL="2514600" indent="-228600" algn="l" rtl="0" eaLnBrk="0" fontAlgn="base" hangingPunct="0">
-              <a:spcBef>
-                <a:spcPct val="20000"/>
-              </a:spcBef>
-              <a:spcAft>
-                <a:spcPct val="0"/>
-              </a:spcAft>
-              <a:buClr>
-                <a:srgbClr val="FFFF99"/>
-              </a:buClr>
-              <a:buSzPct val="125000"/>
-              <a:buFont typeface="Wingdings" charset="0"/>
-              <a:buChar char="§"/>
-              <a:defRPr b="1">
-                <a:solidFill>
-                  <a:schemeClr val="bg1"/>
-                </a:solidFill>
-                <a:latin typeface="+mn-lt"/>
-                <a:ea typeface="+mn-ea"/>
-              </a:defRPr>
-            </a:lvl6pPr>
-            <a:lvl7pPr marL="2971800" indent="-228600" algn="l" rtl="0" eaLnBrk="0" fontAlgn="base" hangingPunct="0">
-              <a:spcBef>
-                <a:spcPct val="20000"/>
-              </a:spcBef>
-              <a:spcAft>
-                <a:spcPct val="0"/>
-              </a:spcAft>
-              <a:buClr>
-                <a:srgbClr val="FFFF99"/>
-              </a:buClr>
-              <a:buSzPct val="125000"/>
-              <a:buFont typeface="Wingdings" charset="0"/>
-              <a:buChar char="§"/>
-              <a:defRPr b="1">
-                <a:solidFill>
-                  <a:schemeClr val="bg1"/>
-                </a:solidFill>
-                <a:latin typeface="+mn-lt"/>
-                <a:ea typeface="+mn-ea"/>
-              </a:defRPr>
-            </a:lvl7pPr>
-            <a:lvl8pPr marL="3429000" indent="-228600" algn="l" rtl="0" eaLnBrk="0" fontAlgn="base" hangingPunct="0">
-              <a:spcBef>
-                <a:spcPct val="20000"/>
-              </a:spcBef>
-              <a:spcAft>
-                <a:spcPct val="0"/>
-              </a:spcAft>
-              <a:buClr>
-                <a:srgbClr val="FFFF99"/>
-              </a:buClr>
-              <a:buSzPct val="125000"/>
-              <a:buFont typeface="Wingdings" charset="0"/>
-              <a:buChar char="§"/>
-              <a:defRPr b="1">
-                <a:solidFill>
-                  <a:schemeClr val="bg1"/>
-                </a:solidFill>
-                <a:latin typeface="+mn-lt"/>
-                <a:ea typeface="+mn-ea"/>
-              </a:defRPr>
-            </a:lvl8pPr>
-            <a:lvl9pPr marL="3886200" indent="-228600" algn="l" rtl="0" eaLnBrk="0" fontAlgn="base" hangingPunct="0">
-              <a:spcBef>
-                <a:spcPct val="20000"/>
-              </a:spcBef>
-              <a:spcAft>
-                <a:spcPct val="0"/>
-              </a:spcAft>
-              <a:buClr>
-                <a:srgbClr val="FFFF99"/>
-              </a:buClr>
-              <a:buSzPct val="125000"/>
-              <a:buFont typeface="Wingdings" charset="0"/>
-              <a:buChar char="§"/>
-              <a:defRPr b="1">
-                <a:solidFill>
-                  <a:schemeClr val="bg1"/>
-                </a:solidFill>
-                <a:latin typeface="+mn-lt"/>
-                <a:ea typeface="+mn-ea"/>
-              </a:defRPr>
-            </a:lvl9pPr>
-          </a:lstStyle>
-          <a:p>
-            <a:pPr marL="0" indent="0">
-              <a:buNone/>
-              <a:defRPr/>
-            </a:pPr>
-            <a:r>
-              <a:rPr lang="en-US" sz="3600" kern="0" dirty="0"/>
-              <a:t>Why do we need to know about matrix solution techniques?</a:t>
-            </a:r>
-          </a:p>
-          <a:p>
-            <a:pPr marL="0" indent="0">
-              <a:buNone/>
-              <a:defRPr/>
-            </a:pPr>
-            <a:r>
-              <a:rPr lang="en-US" sz="3600" kern="0" dirty="0"/>
-              <a:t> </a:t>
-            </a:r>
-          </a:p>
-          <a:p>
-            <a:pPr marL="466725" indent="0">
-              <a:buNone/>
-              <a:defRPr/>
-            </a:pPr>
-            <a:r>
-              <a:rPr lang="en-US" sz="3600" kern="0" dirty="0"/>
-              <a:t>Because matrix solutions to the flow equation using default parameters can fail to achieve convergence or can be modified to improve performance.</a:t>
-            </a:r>
-          </a:p>
-        </p:txBody>
-      </p:sp>
+      </p:pic>
     </p:spTree>
     <p:extLst>
       <p:ext uri="{BB962C8B-B14F-4D97-AF65-F5344CB8AC3E}">
-        <p14:creationId xmlns:p14="http://schemas.microsoft.com/office/powerpoint/2010/main" val="2843997105"/>
+        <p14:creationId xmlns:p14="http://schemas.microsoft.com/office/powerpoint/2010/main" val="1410533407"/>
       </p:ext>
     </p:extLst>
   </p:cSld>
@@ -11688,6 +11732,215 @@
           <p:cNvPr id="2" name="Title 1">
             <a:extLst>
               <a:ext uri="{FF2B5EF4-FFF2-40B4-BE49-F238E27FC236}">
+                <a16:creationId xmlns:a16="http://schemas.microsoft.com/office/drawing/2014/main" id="{B4A99B5D-8321-8378-F28A-A54EA2967236}"/>
+              </a:ext>
+            </a:extLst>
+          </p:cNvPr>
+          <p:cNvSpPr>
+            <a:spLocks noGrp="1"/>
+          </p:cNvSpPr>
+          <p:nvPr>
+            <p:ph type="title"/>
+          </p:nvPr>
+        </p:nvSpPr>
+        <p:spPr/>
+        <p:txBody>
+          <a:bodyPr/>
+          <a:lstStyle/>
+          <a:p>
+            <a:r>
+              <a:rPr lang="en-US" dirty="0"/>
+              <a:t>Gaussian Elimination example</a:t>
+            </a:r>
+          </a:p>
+        </p:txBody>
+      </p:sp>
+      <p:pic>
+        <p:nvPicPr>
+          <p:cNvPr id="5" name="Picture 4" descr="latex-image-1.pdf">
+            <a:extLst>
+              <a:ext uri="{FF2B5EF4-FFF2-40B4-BE49-F238E27FC236}">
+                <a16:creationId xmlns:a16="http://schemas.microsoft.com/office/drawing/2014/main" id="{15D0EDF4-BF4E-5AD0-8AD4-1889C0B00C73}"/>
+              </a:ext>
+            </a:extLst>
+          </p:cNvPr>
+          <p:cNvPicPr>
+            <a:picLocks noChangeAspect="1"/>
+          </p:cNvPicPr>
+          <p:nvPr/>
+        </p:nvPicPr>
+        <p:blipFill>
+          <a:blip r:embed="rId2">
+            <a:extLst>
+              <a:ext uri="{28A0092B-C50C-407E-A947-70E740481C1C}">
+                <a14:useLocalDpi xmlns:a14="http://schemas.microsoft.com/office/drawing/2010/main" val="0"/>
+              </a:ext>
+            </a:extLst>
+          </a:blip>
+          <a:stretch>
+            <a:fillRect/>
+          </a:stretch>
+        </p:blipFill>
+        <p:spPr>
+          <a:xfrm>
+            <a:off x="3308555" y="1371600"/>
+            <a:ext cx="5574890" cy="2057400"/>
+          </a:xfrm>
+          <a:prstGeom prst="rect">
+            <a:avLst/>
+          </a:prstGeom>
+        </p:spPr>
+      </p:pic>
+      <p:pic>
+        <p:nvPicPr>
+          <p:cNvPr id="6" name="Picture 5">
+            <a:extLst>
+              <a:ext uri="{FF2B5EF4-FFF2-40B4-BE49-F238E27FC236}">
+                <a16:creationId xmlns:a16="http://schemas.microsoft.com/office/drawing/2014/main" id="{1677CF1B-69C5-8C50-A661-9FB14F9FEBF2}"/>
+              </a:ext>
+            </a:extLst>
+          </p:cNvPr>
+          <p:cNvPicPr>
+            <a:picLocks noChangeAspect="1"/>
+          </p:cNvPicPr>
+          <p:nvPr/>
+        </p:nvPicPr>
+        <p:blipFill>
+          <a:blip r:embed="rId3"/>
+          <a:stretch>
+            <a:fillRect/>
+          </a:stretch>
+        </p:blipFill>
+        <p:spPr>
+          <a:xfrm>
+            <a:off x="2677550" y="4435479"/>
+            <a:ext cx="6836900" cy="2057400"/>
+          </a:xfrm>
+          <a:prstGeom prst="rect">
+            <a:avLst/>
+          </a:prstGeom>
+        </p:spPr>
+      </p:pic>
+      <p:sp>
+        <p:nvSpPr>
+          <p:cNvPr id="7" name="Down Arrow 6">
+            <a:extLst>
+              <a:ext uri="{FF2B5EF4-FFF2-40B4-BE49-F238E27FC236}">
+                <a16:creationId xmlns:a16="http://schemas.microsoft.com/office/drawing/2014/main" id="{7EAF2584-95E2-EA8E-B69A-C257303A7873}"/>
+              </a:ext>
+            </a:extLst>
+          </p:cNvPr>
+          <p:cNvSpPr/>
+          <p:nvPr/>
+        </p:nvSpPr>
+        <p:spPr bwMode="auto">
+          <a:xfrm>
+            <a:off x="5424487" y="3589339"/>
+            <a:ext cx="1343025" cy="685800"/>
+          </a:xfrm>
+          <a:prstGeom prst="downArrow">
+            <a:avLst/>
+          </a:prstGeom>
+          <a:solidFill>
+            <a:schemeClr val="bg1"/>
+          </a:solidFill>
+          <a:ln w="12700" cap="flat" cmpd="sng" algn="ctr">
+            <a:solidFill>
+              <a:schemeClr val="bg1"/>
+            </a:solidFill>
+            <a:prstDash val="solid"/>
+            <a:round/>
+            <a:headEnd type="none" w="med" len="med"/>
+            <a:tailEnd type="none" w="med" len="med"/>
+          </a:ln>
+          <a:effectLst/>
+          <a:extLst>
+            <a:ext uri="{AF507438-7753-43e0-B8FC-AC1667EBCBE1}">
+              <a14:hiddenEffects xmlns="" xmlns:a14="http://schemas.microsoft.com/office/drawing/2010/main">
+                <a:effectLst>
+                  <a:outerShdw blurRad="63500" dist="38099" dir="2700000" algn="ctr" rotWithShape="0">
+                    <a:schemeClr val="bg2">
+                      <a:alpha val="74998"/>
+                    </a:schemeClr>
+                  </a:outerShdw>
+                </a:effectLst>
+              </a14:hiddenEffects>
+            </a:ext>
+          </a:extLst>
+        </p:spPr>
+        <p:txBody>
+          <a:bodyPr vert="horz" wrap="square" lIns="91440" tIns="45720" rIns="91440" bIns="45720" numCol="1" rtlCol="0" anchor="t" anchorCtr="0" compatLnSpc="1">
+            <a:prstTxWarp prst="textNoShape">
+              <a:avLst/>
+            </a:prstTxWarp>
+          </a:bodyPr>
+          <a:lstStyle/>
+          <a:p>
+            <a:pPr marL="0" marR="0" indent="0" algn="l" defTabSz="914400" rtl="0" eaLnBrk="0" fontAlgn="base" latinLnBrk="0" hangingPunct="0">
+              <a:lnSpc>
+                <a:spcPct val="100000"/>
+              </a:lnSpc>
+              <a:spcBef>
+                <a:spcPct val="0"/>
+              </a:spcBef>
+              <a:spcAft>
+                <a:spcPct val="0"/>
+              </a:spcAft>
+              <a:buClrTx/>
+              <a:buSzTx/>
+              <a:buFontTx/>
+              <a:buNone/>
+              <a:tabLst/>
+            </a:pPr>
+            <a:endParaRPr kumimoji="0" lang="en-US" sz="4000" b="0" i="0" u="none" strike="noStrike" cap="none" normalizeH="0" baseline="0">
+              <a:ln>
+                <a:noFill/>
+              </a:ln>
+              <a:solidFill>
+                <a:schemeClr val="tx1"/>
+              </a:solidFill>
+              <a:effectLst/>
+              <a:latin typeface="Arial" charset="0"/>
+              <a:ea typeface="ＭＳ Ｐゴシック" charset="0"/>
+            </a:endParaRPr>
+          </a:p>
+        </p:txBody>
+      </p:sp>
+    </p:spTree>
+    <p:extLst>
+      <p:ext uri="{BB962C8B-B14F-4D97-AF65-F5344CB8AC3E}">
+        <p14:creationId xmlns:p14="http://schemas.microsoft.com/office/powerpoint/2010/main" val="893119184"/>
+      </p:ext>
+    </p:extLst>
+  </p:cSld>
+  <p:clrMapOvr>
+    <a:masterClrMapping/>
+  </p:clrMapOvr>
+</p:sld>
+</file>
+
+<file path=ppt/slides/slide7.xml><?xml version="1.0" encoding="utf-8"?>
+<p:sld xmlns:a="http://schemas.openxmlformats.org/drawingml/2006/main" xmlns:r="http://schemas.openxmlformats.org/officeDocument/2006/relationships" xmlns:p="http://schemas.openxmlformats.org/presentationml/2006/main">
+  <p:cSld>
+    <p:spTree>
+      <p:nvGrpSpPr>
+        <p:cNvPr id="1" name=""/>
+        <p:cNvGrpSpPr/>
+        <p:nvPr/>
+      </p:nvGrpSpPr>
+      <p:grpSpPr>
+        <a:xfrm>
+          <a:off x="0" y="0"/>
+          <a:ext cx="0" cy="0"/>
+          <a:chOff x="0" y="0"/>
+          <a:chExt cx="0" cy="0"/>
+        </a:xfrm>
+      </p:grpSpPr>
+      <p:sp>
+        <p:nvSpPr>
+          <p:cNvPr id="2" name="Title 1">
+            <a:extLst>
+              <a:ext uri="{FF2B5EF4-FFF2-40B4-BE49-F238E27FC236}">
                 <a16:creationId xmlns:a16="http://schemas.microsoft.com/office/drawing/2014/main" id="{AC9AE41B-401A-2746-80D0-244CA64D279E}"/>
               </a:ext>
             </a:extLst>
@@ -12036,7 +12289,7 @@
 </p:sld>
 </file>
 
-<file path=ppt/slides/slide7.xml><?xml version="1.0" encoding="utf-8"?>
+<file path=ppt/slides/slide8.xml><?xml version="1.0" encoding="utf-8"?>
 <p:sld xmlns:a="http://schemas.openxmlformats.org/drawingml/2006/main" xmlns:r="http://schemas.openxmlformats.org/officeDocument/2006/relationships" xmlns:p="http://schemas.openxmlformats.org/presentationml/2006/main">
   <p:cSld>
     <p:spTree>
@@ -12321,7 +12574,7 @@
 </p:sld>
 </file>
 
-<file path=ppt/slides/slide8.xml><?xml version="1.0" encoding="utf-8"?>
+<file path=ppt/slides/slide9.xml><?xml version="1.0" encoding="utf-8"?>
 <p:sld xmlns:a="http://schemas.openxmlformats.org/drawingml/2006/main" xmlns:r="http://schemas.openxmlformats.org/officeDocument/2006/relationships" xmlns:p="http://schemas.openxmlformats.org/presentationml/2006/main">
   <p:cSld>
     <p:spTree>
@@ -12597,291 +12850,6 @@
     <p:extLst>
       <p:ext uri="{BB962C8B-B14F-4D97-AF65-F5344CB8AC3E}">
         <p14:creationId xmlns:p14="http://schemas.microsoft.com/office/powerpoint/2010/main" val="2188039324"/>
-      </p:ext>
-    </p:extLst>
-  </p:cSld>
-  <p:clrMapOvr>
-    <a:masterClrMapping/>
-  </p:clrMapOvr>
-</p:sld>
-</file>
-
-<file path=ppt/slides/slide9.xml><?xml version="1.0" encoding="utf-8"?>
-<p:sld xmlns:a="http://schemas.openxmlformats.org/drawingml/2006/main" xmlns:r="http://schemas.openxmlformats.org/officeDocument/2006/relationships" xmlns:p="http://schemas.openxmlformats.org/presentationml/2006/main">
-  <p:cSld>
-    <p:spTree>
-      <p:nvGrpSpPr>
-        <p:cNvPr id="1" name=""/>
-        <p:cNvGrpSpPr/>
-        <p:nvPr/>
-      </p:nvGrpSpPr>
-      <p:grpSpPr>
-        <a:xfrm>
-          <a:off x="0" y="0"/>
-          <a:ext cx="0" cy="0"/>
-          <a:chOff x="0" y="0"/>
-          <a:chExt cx="0" cy="0"/>
-        </a:xfrm>
-      </p:grpSpPr>
-      <p:sp>
-        <p:nvSpPr>
-          <p:cNvPr id="2" name="Title 1">
-            <a:extLst>
-              <a:ext uri="{FF2B5EF4-FFF2-40B4-BE49-F238E27FC236}">
-                <a16:creationId xmlns:a16="http://schemas.microsoft.com/office/drawing/2014/main" id="{AC9AE41B-401A-2746-80D0-244CA64D279E}"/>
-              </a:ext>
-            </a:extLst>
-          </p:cNvPr>
-          <p:cNvSpPr>
-            <a:spLocks noGrp="1"/>
-          </p:cNvSpPr>
-          <p:nvPr>
-            <p:ph type="title"/>
-          </p:nvPr>
-        </p:nvSpPr>
-        <p:spPr/>
-        <p:txBody>
-          <a:bodyPr/>
-          <a:lstStyle/>
-          <a:p>
-            <a:r>
-              <a:rPr lang="en-US" dirty="0"/>
-              <a:t>Gaussian Elimination example</a:t>
-            </a:r>
-          </a:p>
-        </p:txBody>
-      </p:sp>
-      <p:sp>
-        <p:nvSpPr>
-          <p:cNvPr id="3" name="Text Box 4">
-            <a:extLst>
-              <a:ext uri="{FF2B5EF4-FFF2-40B4-BE49-F238E27FC236}">
-                <a16:creationId xmlns:a16="http://schemas.microsoft.com/office/drawing/2014/main" id="{46217574-8E5C-C54C-9B59-718761D2C7EE}"/>
-              </a:ext>
-            </a:extLst>
-          </p:cNvPr>
-          <p:cNvSpPr txBox="1">
-            <a:spLocks noChangeArrowheads="1"/>
-          </p:cNvSpPr>
-          <p:nvPr/>
-        </p:nvSpPr>
-        <p:spPr bwMode="auto">
-          <a:xfrm>
-            <a:off x="2566988" y="4184650"/>
-            <a:ext cx="7021512" cy="1631950"/>
-          </a:xfrm>
-          <a:prstGeom prst="rect">
-            <a:avLst/>
-          </a:prstGeom>
-          <a:noFill/>
-          <a:ln>
-            <a:noFill/>
-          </a:ln>
-          <a:effectLst/>
-          <a:extLst>
-            <a:ext uri="{909E8E84-426E-40dd-AFC4-6F175D3DCCD1}">
-              <a14:hiddenFill xmlns="" xmlns:a14="http://schemas.microsoft.com/office/drawing/2010/main">
-                <a:solidFill>
-                  <a:schemeClr val="accent1"/>
-                </a:solidFill>
-              </a14:hiddenFill>
-            </a:ext>
-            <a:ext uri="{91240B29-F687-4f45-9708-019B960494DF}">
-              <a14:hiddenLine xmlns="" xmlns:a14="http://schemas.microsoft.com/office/drawing/2010/main" w="9525">
-                <a:solidFill>
-                  <a:schemeClr val="tx1"/>
-                </a:solidFill>
-                <a:miter lim="800000"/>
-                <a:headEnd/>
-                <a:tailEnd/>
-              </a14:hiddenLine>
-            </a:ext>
-            <a:ext uri="{AF507438-7753-43e0-B8FC-AC1667EBCBE1}">
-              <a14:hiddenEffects xmlns="" xmlns:a14="http://schemas.microsoft.com/office/drawing/2010/main">
-                <a:effectLst>
-                  <a:outerShdw blurRad="63500" dist="38099" dir="2700000" algn="ctr" rotWithShape="0">
-                    <a:schemeClr val="bg2">
-                      <a:alpha val="74998"/>
-                    </a:schemeClr>
-                  </a:outerShdw>
-                </a:effectLst>
-              </a14:hiddenEffects>
-            </a:ext>
-          </a:extLst>
-        </p:spPr>
-        <p:txBody>
-          <a:bodyPr>
-            <a:spAutoFit/>
-          </a:bodyPr>
-          <a:lstStyle>
-            <a:lvl1pPr eaLnBrk="0" hangingPunct="0">
-              <a:defRPr>
-                <a:solidFill>
-                  <a:schemeClr val="tx1"/>
-                </a:solidFill>
-                <a:latin typeface="Arial" charset="0"/>
-                <a:ea typeface="ＭＳ Ｐゴシック" charset="0"/>
-              </a:defRPr>
-            </a:lvl1pPr>
-            <a:lvl2pPr marL="742950" indent="-285750" eaLnBrk="0" hangingPunct="0">
-              <a:defRPr>
-                <a:solidFill>
-                  <a:schemeClr val="tx1"/>
-                </a:solidFill>
-                <a:latin typeface="Arial" charset="0"/>
-                <a:ea typeface="ＭＳ Ｐゴシック" charset="0"/>
-              </a:defRPr>
-            </a:lvl2pPr>
-            <a:lvl3pPr marL="1143000" indent="-228600" eaLnBrk="0" hangingPunct="0">
-              <a:defRPr>
-                <a:solidFill>
-                  <a:schemeClr val="tx1"/>
-                </a:solidFill>
-                <a:latin typeface="Arial" charset="0"/>
-                <a:ea typeface="ＭＳ Ｐゴシック" charset="0"/>
-              </a:defRPr>
-            </a:lvl3pPr>
-            <a:lvl4pPr marL="1600200" indent="-228600" eaLnBrk="0" hangingPunct="0">
-              <a:defRPr>
-                <a:solidFill>
-                  <a:schemeClr val="tx1"/>
-                </a:solidFill>
-                <a:latin typeface="Arial" charset="0"/>
-                <a:ea typeface="ＭＳ Ｐゴシック" charset="0"/>
-              </a:defRPr>
-            </a:lvl4pPr>
-            <a:lvl5pPr marL="2057400" indent="-228600" eaLnBrk="0" hangingPunct="0">
-              <a:defRPr>
-                <a:solidFill>
-                  <a:schemeClr val="tx1"/>
-                </a:solidFill>
-                <a:latin typeface="Arial" charset="0"/>
-                <a:ea typeface="ＭＳ Ｐゴシック" charset="0"/>
-              </a:defRPr>
-            </a:lvl5pPr>
-            <a:lvl6pPr marL="2514600" indent="-228600" eaLnBrk="0" fontAlgn="base" hangingPunct="0">
-              <a:spcBef>
-                <a:spcPct val="0"/>
-              </a:spcBef>
-              <a:spcAft>
-                <a:spcPct val="0"/>
-              </a:spcAft>
-              <a:defRPr>
-                <a:solidFill>
-                  <a:schemeClr val="tx1"/>
-                </a:solidFill>
-                <a:latin typeface="Arial" charset="0"/>
-                <a:ea typeface="ＭＳ Ｐゴシック" charset="0"/>
-              </a:defRPr>
-            </a:lvl6pPr>
-            <a:lvl7pPr marL="2971800" indent="-228600" eaLnBrk="0" fontAlgn="base" hangingPunct="0">
-              <a:spcBef>
-                <a:spcPct val="0"/>
-              </a:spcBef>
-              <a:spcAft>
-                <a:spcPct val="0"/>
-              </a:spcAft>
-              <a:defRPr>
-                <a:solidFill>
-                  <a:schemeClr val="tx1"/>
-                </a:solidFill>
-                <a:latin typeface="Arial" charset="0"/>
-                <a:ea typeface="ＭＳ Ｐゴシック" charset="0"/>
-              </a:defRPr>
-            </a:lvl7pPr>
-            <a:lvl8pPr marL="3429000" indent="-228600" eaLnBrk="0" fontAlgn="base" hangingPunct="0">
-              <a:spcBef>
-                <a:spcPct val="0"/>
-              </a:spcBef>
-              <a:spcAft>
-                <a:spcPct val="0"/>
-              </a:spcAft>
-              <a:defRPr>
-                <a:solidFill>
-                  <a:schemeClr val="tx1"/>
-                </a:solidFill>
-                <a:latin typeface="Arial" charset="0"/>
-                <a:ea typeface="ＭＳ Ｐゴシック" charset="0"/>
-              </a:defRPr>
-            </a:lvl8pPr>
-            <a:lvl9pPr marL="3886200" indent="-228600" eaLnBrk="0" fontAlgn="base" hangingPunct="0">
-              <a:spcBef>
-                <a:spcPct val="0"/>
-              </a:spcBef>
-              <a:spcAft>
-                <a:spcPct val="0"/>
-              </a:spcAft>
-              <a:defRPr>
-                <a:solidFill>
-                  <a:schemeClr val="tx1"/>
-                </a:solidFill>
-                <a:latin typeface="Arial" charset="0"/>
-                <a:ea typeface="ＭＳ Ｐゴシック" charset="0"/>
-              </a:defRPr>
-            </a:lvl9pPr>
-          </a:lstStyle>
-          <a:p>
-            <a:pPr marL="1143000" indent="-1143000" eaLnBrk="1" hangingPunct="1">
-              <a:spcBef>
-                <a:spcPct val="50000"/>
-              </a:spcBef>
-              <a:tabLst>
-                <a:tab pos="1143000" algn="l"/>
-              </a:tabLst>
-              <a:defRPr/>
-            </a:pPr>
-            <a:r>
-              <a:rPr lang="en-US" sz="2000" dirty="0">
-                <a:solidFill>
-                  <a:schemeClr val="bg1"/>
-                </a:solidFill>
-                <a:cs typeface="+mn-cs"/>
-              </a:rPr>
-              <a:t>Step 5 – 	Subtract a multiple of equation 2 from all lower equations to eliminate Y from those equations. That is, make the coefficient 0 for all rows in the column below A(2,2). Subtract 1 times equation 2 from equation 3.</a:t>
-            </a:r>
-          </a:p>
-        </p:txBody>
-      </p:sp>
-      <p:pic>
-        <p:nvPicPr>
-          <p:cNvPr id="4" name="Picture 3" descr="latex-image-1.pdf">
-            <a:extLst>
-              <a:ext uri="{FF2B5EF4-FFF2-40B4-BE49-F238E27FC236}">
-                <a16:creationId xmlns:a16="http://schemas.microsoft.com/office/drawing/2014/main" id="{BE92C163-E02F-574B-B0C8-FD01B8B824B6}"/>
-              </a:ext>
-            </a:extLst>
-          </p:cNvPr>
-          <p:cNvPicPr>
-            <a:picLocks noChangeAspect="1"/>
-          </p:cNvPicPr>
-          <p:nvPr/>
-        </p:nvPicPr>
-        <p:blipFill>
-          <a:blip r:embed="rId2">
-            <a:extLst>
-              <a:ext uri="{28A0092B-C50C-407E-A947-70E740481C1C}">
-                <a14:useLocalDpi xmlns:a14="http://schemas.microsoft.com/office/drawing/2010/main" val="0"/>
-              </a:ext>
-            </a:extLst>
-          </a:blip>
-          <a:stretch>
-            <a:fillRect/>
-          </a:stretch>
-        </p:blipFill>
-        <p:spPr>
-          <a:xfrm>
-            <a:off x="2895600" y="1133856"/>
-            <a:ext cx="6400800" cy="1968500"/>
-          </a:xfrm>
-          <a:prstGeom prst="rect">
-            <a:avLst/>
-          </a:prstGeom>
-        </p:spPr>
-      </p:pic>
-    </p:spTree>
-    <p:extLst>
-      <p:ext uri="{BB962C8B-B14F-4D97-AF65-F5344CB8AC3E}">
-        <p14:creationId xmlns:p14="http://schemas.microsoft.com/office/powerpoint/2010/main" val="2241180209"/>
       </p:ext>
     </p:extLst>
   </p:cSld>

</xml_diff>